<commit_message>
updated ppt and added study area map
</commit_message>
<xml_diff>
--- a/PredictiveCrashAnalysis.pptx
+++ b/PredictiveCrashAnalysis.pptx
@@ -5,20 +5,21 @@
     <p:sldMasterId id="2147484111" r:id="rId1"/>
   </p:sldMasterIdLst>
   <p:notesMasterIdLst>
-    <p:notesMasterId r:id="rId13"/>
+    <p:notesMasterId r:id="rId14"/>
   </p:notesMasterIdLst>
   <p:sldIdLst>
     <p:sldId id="256" r:id="rId2"/>
     <p:sldId id="257" r:id="rId3"/>
-    <p:sldId id="269" r:id="rId4"/>
-    <p:sldId id="264" r:id="rId5"/>
-    <p:sldId id="265" r:id="rId6"/>
-    <p:sldId id="272" r:id="rId7"/>
-    <p:sldId id="270" r:id="rId8"/>
-    <p:sldId id="271" r:id="rId9"/>
-    <p:sldId id="266" r:id="rId10"/>
+    <p:sldId id="273" r:id="rId4"/>
+    <p:sldId id="269" r:id="rId5"/>
+    <p:sldId id="264" r:id="rId6"/>
+    <p:sldId id="265" r:id="rId7"/>
+    <p:sldId id="272" r:id="rId8"/>
+    <p:sldId id="270" r:id="rId9"/>
+    <p:sldId id="271" r:id="rId10"/>
     <p:sldId id="267" r:id="rId11"/>
     <p:sldId id="268" r:id="rId12"/>
+    <p:sldId id="274" r:id="rId13"/>
   </p:sldIdLst>
   <p:sldSz cx="12192000" cy="6858000"/>
   <p:notesSz cx="6858000" cy="9144000"/>
@@ -207,7 +208,7 @@
           <a:p>
             <a:fld id="{1EE0AD7B-87D2-3B41-8A8B-6777158ABCAD}" type="datetimeFigureOut">
               <a:rPr lang="en-US" smtClean="0"/>
-              <a:t>3/27/24</a:t>
+              <a:t>3/27/2024</a:t>
             </a:fld>
             <a:endParaRPr lang="en-US"/>
           </a:p>
@@ -539,7 +540,7 @@
           <a:p>
             <a:fld id="{E627D67B-A2BE-8441-98D1-15A3A731A8EA}" type="slidenum">
               <a:rPr lang="en-US" smtClean="0"/>
-              <a:t>6</a:t>
+              <a:t>7</a:t>
             </a:fld>
             <a:endParaRPr lang="en-US"/>
           </a:p>
@@ -689,7 +690,7 @@
           <a:p>
             <a:fld id="{2CDE808C-B126-0144-8065-6E132F6EBBC5}" type="datetimeFigureOut">
               <a:rPr lang="en-US" smtClean="0"/>
-              <a:t>3/26/24</a:t>
+              <a:t>3/27/2024</a:t>
             </a:fld>
             <a:endParaRPr lang="en-US"/>
           </a:p>
@@ -859,7 +860,7 @@
           <a:p>
             <a:fld id="{F85E7725-CF6D-4D4B-8907-4A64A43F204C}" type="datetimeFigureOut">
               <a:rPr lang="en-US" smtClean="0"/>
-              <a:t>3/26/24</a:t>
+              <a:t>3/27/2024</a:t>
             </a:fld>
             <a:endParaRPr lang="en-US"/>
           </a:p>
@@ -1039,7 +1040,7 @@
           <a:p>
             <a:fld id="{F85E7725-CF6D-4D4B-8907-4A64A43F204C}" type="datetimeFigureOut">
               <a:rPr lang="en-US" smtClean="0"/>
-              <a:t>3/26/24</a:t>
+              <a:t>3/27/2024</a:t>
             </a:fld>
             <a:endParaRPr lang="en-US"/>
           </a:p>
@@ -1209,7 +1210,7 @@
           <a:p>
             <a:fld id="{F85E7725-CF6D-4D4B-8907-4A64A43F204C}" type="datetimeFigureOut">
               <a:rPr lang="en-US" smtClean="0"/>
-              <a:t>3/26/24</a:t>
+              <a:t>3/27/2024</a:t>
             </a:fld>
             <a:endParaRPr lang="en-US"/>
           </a:p>
@@ -1455,7 +1456,7 @@
           <a:p>
             <a:fld id="{F85E7725-CF6D-4D4B-8907-4A64A43F204C}" type="datetimeFigureOut">
               <a:rPr lang="en-US" smtClean="0"/>
-              <a:t>3/26/24</a:t>
+              <a:t>3/27/2024</a:t>
             </a:fld>
             <a:endParaRPr lang="en-US"/>
           </a:p>
@@ -1687,7 +1688,7 @@
           <a:p>
             <a:fld id="{F85E7725-CF6D-4D4B-8907-4A64A43F204C}" type="datetimeFigureOut">
               <a:rPr lang="en-US" smtClean="0"/>
-              <a:t>3/26/24</a:t>
+              <a:t>3/27/2024</a:t>
             </a:fld>
             <a:endParaRPr lang="en-US"/>
           </a:p>
@@ -2054,7 +2055,7 @@
           <a:p>
             <a:fld id="{F85E7725-CF6D-4D4B-8907-4A64A43F204C}" type="datetimeFigureOut">
               <a:rPr lang="en-US" smtClean="0"/>
-              <a:t>3/26/24</a:t>
+              <a:t>3/27/2024</a:t>
             </a:fld>
             <a:endParaRPr lang="en-US"/>
           </a:p>
@@ -2172,7 +2173,7 @@
           <a:p>
             <a:fld id="{F85E7725-CF6D-4D4B-8907-4A64A43F204C}" type="datetimeFigureOut">
               <a:rPr lang="en-US" smtClean="0"/>
-              <a:t>3/26/24</a:t>
+              <a:t>3/27/2024</a:t>
             </a:fld>
             <a:endParaRPr lang="en-US"/>
           </a:p>
@@ -2267,7 +2268,7 @@
           <a:p>
             <a:fld id="{F85E7725-CF6D-4D4B-8907-4A64A43F204C}" type="datetimeFigureOut">
               <a:rPr lang="en-US" smtClean="0"/>
-              <a:t>3/26/24</a:t>
+              <a:t>3/27/2024</a:t>
             </a:fld>
             <a:endParaRPr lang="en-US"/>
           </a:p>
@@ -2544,7 +2545,7 @@
           <a:p>
             <a:fld id="{F85E7725-CF6D-4D4B-8907-4A64A43F204C}" type="datetimeFigureOut">
               <a:rPr lang="en-US" smtClean="0"/>
-              <a:t>3/26/24</a:t>
+              <a:t>3/27/2024</a:t>
             </a:fld>
             <a:endParaRPr lang="en-US"/>
           </a:p>
@@ -2801,7 +2802,7 @@
           <a:p>
             <a:fld id="{F85E7725-CF6D-4D4B-8907-4A64A43F204C}" type="datetimeFigureOut">
               <a:rPr lang="en-US" smtClean="0"/>
-              <a:t>3/26/24</a:t>
+              <a:t>3/27/2024</a:t>
             </a:fld>
             <a:endParaRPr lang="en-US"/>
           </a:p>
@@ -3014,7 +3015,7 @@
           <a:p>
             <a:fld id="{F85E7725-CF6D-4D4B-8907-4A64A43F204C}" type="datetimeFigureOut">
               <a:rPr lang="en-US" smtClean="0"/>
-              <a:t>3/26/24</a:t>
+              <a:t>3/27/2024</a:t>
             </a:fld>
             <a:endParaRPr lang="en-US"/>
           </a:p>
@@ -3652,13 +3653,7 @@
           <a:p>
             <a:r>
               <a:rPr lang="en-US" dirty="0"/>
-              <a:t>Purpose of analysis</a:t>
-            </a:r>
-          </a:p>
-          <a:p>
-            <a:r>
-              <a:rPr lang="en-US" dirty="0"/>
-              <a:t>Data source</a:t>
+              <a:t>Blah blah</a:t>
             </a:r>
           </a:p>
           <a:p>
@@ -3782,13 +3777,7 @@
           <a:p>
             <a:r>
               <a:rPr lang="en-US" dirty="0"/>
-              <a:t>Purpose of analysis</a:t>
-            </a:r>
-          </a:p>
-          <a:p>
-            <a:r>
-              <a:rPr lang="en-US" dirty="0"/>
-              <a:t>Data source</a:t>
+              <a:t>Blah Blah</a:t>
             </a:r>
           </a:p>
           <a:p>
@@ -3800,6 +3789,272 @@
     <p:extLst>
       <p:ext uri="{BB962C8B-B14F-4D97-AF65-F5344CB8AC3E}">
         <p14:creationId xmlns:p14="http://schemas.microsoft.com/office/powerpoint/2010/main" val="3898302957"/>
+      </p:ext>
+    </p:extLst>
+  </p:cSld>
+  <p:clrMapOvr>
+    <a:masterClrMapping/>
+  </p:clrMapOvr>
+</p:sld>
+</file>
+
+<file path=ppt/slides/slide12.xml><?xml version="1.0" encoding="utf-8"?>
+<p:sld xmlns:a="http://schemas.openxmlformats.org/drawingml/2006/main" xmlns:r="http://schemas.openxmlformats.org/officeDocument/2006/relationships" xmlns:p="http://schemas.openxmlformats.org/presentationml/2006/main">
+  <p:cSld>
+    <p:spTree>
+      <p:nvGrpSpPr>
+        <p:cNvPr id="1" name=""/>
+        <p:cNvGrpSpPr/>
+        <p:nvPr/>
+      </p:nvGrpSpPr>
+      <p:grpSpPr>
+        <a:xfrm>
+          <a:off x="0" y="0"/>
+          <a:ext cx="0" cy="0"/>
+          <a:chOff x="0" y="0"/>
+          <a:chExt cx="0" cy="0"/>
+        </a:xfrm>
+      </p:grpSpPr>
+      <p:sp>
+        <p:nvSpPr>
+          <p:cNvPr id="2" name="Title 1">
+            <a:extLst>
+              <a:ext uri="{FF2B5EF4-FFF2-40B4-BE49-F238E27FC236}">
+                <a16:creationId xmlns:a16="http://schemas.microsoft.com/office/drawing/2014/main" id="{548B87B9-445C-4013-ED38-AA83EF98FA26}"/>
+              </a:ext>
+            </a:extLst>
+          </p:cNvPr>
+          <p:cNvSpPr>
+            <a:spLocks noGrp="1"/>
+          </p:cNvSpPr>
+          <p:nvPr>
+            <p:ph type="title"/>
+          </p:nvPr>
+        </p:nvSpPr>
+        <p:spPr>
+          <a:xfrm>
+            <a:off x="0" y="0"/>
+            <a:ext cx="12192000" cy="914400"/>
+          </a:xfrm>
+          <a:solidFill>
+            <a:schemeClr val="tx2">
+              <a:lumMod val="10000"/>
+              <a:lumOff val="90000"/>
+            </a:schemeClr>
+          </a:solidFill>
+          <a:ln>
+            <a:noFill/>
+          </a:ln>
+        </p:spPr>
+        <p:style>
+          <a:lnRef idx="1">
+            <a:schemeClr val="accent1"/>
+          </a:lnRef>
+          <a:fillRef idx="2">
+            <a:schemeClr val="accent1"/>
+          </a:fillRef>
+          <a:effectRef idx="1">
+            <a:schemeClr val="accent1"/>
+          </a:effectRef>
+          <a:fontRef idx="minor">
+            <a:schemeClr val="dk1"/>
+          </a:fontRef>
+        </p:style>
+        <p:txBody>
+          <a:bodyPr>
+            <a:normAutofit/>
+          </a:bodyPr>
+          <a:lstStyle/>
+          <a:p>
+            <a:pPr algn="ctr"/>
+            <a:r>
+              <a:rPr lang="en-US" b="1" dirty="0">
+                <a:solidFill>
+                  <a:srgbClr val="002060"/>
+                </a:solidFill>
+              </a:rPr>
+              <a:t>More Details</a:t>
+            </a:r>
+          </a:p>
+        </p:txBody>
+      </p:sp>
+      <p:pic>
+        <p:nvPicPr>
+          <p:cNvPr id="5" name="Content Placeholder 4" descr="A qr code with a blue hexagon&#10;&#10;Description automatically generated">
+            <a:hlinkClick r:id="rId2"/>
+            <a:extLst>
+              <a:ext uri="{FF2B5EF4-FFF2-40B4-BE49-F238E27FC236}">
+                <a16:creationId xmlns:a16="http://schemas.microsoft.com/office/drawing/2014/main" id="{2D671726-5D13-2397-A4EE-1500DCF9A3A6}"/>
+              </a:ext>
+            </a:extLst>
+          </p:cNvPr>
+          <p:cNvPicPr>
+            <a:picLocks noGrp="1" noChangeAspect="1"/>
+          </p:cNvPicPr>
+          <p:nvPr>
+            <p:ph idx="1"/>
+          </p:nvPr>
+        </p:nvPicPr>
+        <p:blipFill>
+          <a:blip r:embed="rId3"/>
+          <a:stretch>
+            <a:fillRect/>
+          </a:stretch>
+        </p:blipFill>
+        <p:spPr>
+          <a:xfrm>
+            <a:off x="1368932" y="1603216"/>
+            <a:ext cx="4351338" cy="4351338"/>
+          </a:xfrm>
+        </p:spPr>
+      </p:pic>
+      <p:pic>
+        <p:nvPicPr>
+          <p:cNvPr id="6" name="Content Placeholder 4">
+            <a:hlinkClick r:id="rId4"/>
+            <a:extLst>
+              <a:ext uri="{FF2B5EF4-FFF2-40B4-BE49-F238E27FC236}">
+                <a16:creationId xmlns:a16="http://schemas.microsoft.com/office/drawing/2014/main" id="{C239DB4B-D413-B49E-86C4-1E0568279CB7}"/>
+              </a:ext>
+            </a:extLst>
+          </p:cNvPr>
+          <p:cNvPicPr>
+            <a:picLocks noChangeAspect="1"/>
+          </p:cNvPicPr>
+          <p:nvPr/>
+        </p:nvPicPr>
+        <p:blipFill>
+          <a:blip r:embed="rId5"/>
+          <a:srcRect/>
+          <a:stretch/>
+        </p:blipFill>
+        <p:spPr>
+          <a:xfrm>
+            <a:off x="6530262" y="1603216"/>
+            <a:ext cx="4351338" cy="4351338"/>
+          </a:xfrm>
+          <a:prstGeom prst="rect">
+            <a:avLst/>
+          </a:prstGeom>
+        </p:spPr>
+      </p:pic>
+      <p:sp>
+        <p:nvSpPr>
+          <p:cNvPr id="7" name="TextBox 6">
+            <a:extLst>
+              <a:ext uri="{FF2B5EF4-FFF2-40B4-BE49-F238E27FC236}">
+                <a16:creationId xmlns:a16="http://schemas.microsoft.com/office/drawing/2014/main" id="{8FA8FC74-6534-D34B-25E3-CF7F6CA60037}"/>
+              </a:ext>
+            </a:extLst>
+          </p:cNvPr>
+          <p:cNvSpPr txBox="1"/>
+          <p:nvPr/>
+        </p:nvSpPr>
+        <p:spPr>
+          <a:xfrm>
+            <a:off x="1368932" y="5986392"/>
+            <a:ext cx="4351337" cy="646331"/>
+          </a:xfrm>
+          <a:prstGeom prst="rect">
+            <a:avLst/>
+          </a:prstGeom>
+          <a:noFill/>
+        </p:spPr>
+        <p:txBody>
+          <a:bodyPr wrap="square" rtlCol="0">
+            <a:spAutoFit/>
+          </a:bodyPr>
+          <a:lstStyle/>
+          <a:p>
+            <a:r>
+              <a:rPr lang="en-US" dirty="0"/>
+              <a:t>Explore the data using an interactive map on ArcGIS Online</a:t>
+            </a:r>
+          </a:p>
+        </p:txBody>
+      </p:sp>
+      <p:sp>
+        <p:nvSpPr>
+          <p:cNvPr id="8" name="TextBox 7">
+            <a:extLst>
+              <a:ext uri="{FF2B5EF4-FFF2-40B4-BE49-F238E27FC236}">
+                <a16:creationId xmlns:a16="http://schemas.microsoft.com/office/drawing/2014/main" id="{A6A61FB9-7840-EC44-A570-C990AC228ADA}"/>
+              </a:ext>
+            </a:extLst>
+          </p:cNvPr>
+          <p:cNvSpPr txBox="1"/>
+          <p:nvPr/>
+        </p:nvSpPr>
+        <p:spPr>
+          <a:xfrm>
+            <a:off x="6530261" y="5954554"/>
+            <a:ext cx="4351337" cy="369332"/>
+          </a:xfrm>
+          <a:prstGeom prst="rect">
+            <a:avLst/>
+          </a:prstGeom>
+          <a:noFill/>
+        </p:spPr>
+        <p:txBody>
+          <a:bodyPr wrap="square" rtlCol="0">
+            <a:spAutoFit/>
+          </a:bodyPr>
+          <a:lstStyle/>
+          <a:p>
+            <a:r>
+              <a:rPr lang="en-US" dirty="0"/>
+              <a:t>View the code and data </a:t>
+            </a:r>
+            <a:r>
+              <a:rPr lang="en-US"/>
+              <a:t>used on </a:t>
+            </a:r>
+            <a:r>
+              <a:rPr lang="en-US" dirty="0"/>
+              <a:t>GitHub</a:t>
+            </a:r>
+          </a:p>
+        </p:txBody>
+      </p:sp>
+      <p:sp>
+        <p:nvSpPr>
+          <p:cNvPr id="9" name="TextBox 8">
+            <a:extLst>
+              <a:ext uri="{FF2B5EF4-FFF2-40B4-BE49-F238E27FC236}">
+                <a16:creationId xmlns:a16="http://schemas.microsoft.com/office/drawing/2014/main" id="{7F11026C-7517-0371-643C-F21AB9BD81DB}"/>
+              </a:ext>
+            </a:extLst>
+          </p:cNvPr>
+          <p:cNvSpPr txBox="1"/>
+          <p:nvPr/>
+        </p:nvSpPr>
+        <p:spPr>
+          <a:xfrm>
+            <a:off x="1734004" y="946238"/>
+            <a:ext cx="8723991" cy="523220"/>
+          </a:xfrm>
+          <a:prstGeom prst="rect">
+            <a:avLst/>
+          </a:prstGeom>
+          <a:noFill/>
+        </p:spPr>
+        <p:txBody>
+          <a:bodyPr wrap="none" rtlCol="0">
+            <a:spAutoFit/>
+          </a:bodyPr>
+          <a:lstStyle/>
+          <a:p>
+            <a:r>
+              <a:rPr lang="en-US" sz="2800" dirty="0"/>
+              <a:t>Scan or click below for more resources about this study</a:t>
+            </a:r>
+          </a:p>
+        </p:txBody>
+      </p:sp>
+    </p:spTree>
+    <p:extLst>
+      <p:ext uri="{BB962C8B-B14F-4D97-AF65-F5344CB8AC3E}">
+        <p14:creationId xmlns:p14="http://schemas.microsoft.com/office/powerpoint/2010/main" val="1142648994"/>
       </p:ext>
     </p:extLst>
   </p:cSld>
@@ -4014,6 +4269,225 @@
                   <a:srgbClr val="002060"/>
                 </a:solidFill>
               </a:rPr>
+              <a:t>Study Area</a:t>
+            </a:r>
+          </a:p>
+        </p:txBody>
+      </p:sp>
+      <p:sp>
+        <p:nvSpPr>
+          <p:cNvPr id="3" name="Content Placeholder 2">
+            <a:extLst>
+              <a:ext uri="{FF2B5EF4-FFF2-40B4-BE49-F238E27FC236}">
+                <a16:creationId xmlns:a16="http://schemas.microsoft.com/office/drawing/2014/main" id="{00AF6D0E-3160-7B0C-A696-D9E4E341928F}"/>
+              </a:ext>
+            </a:extLst>
+          </p:cNvPr>
+          <p:cNvSpPr>
+            <a:spLocks noGrp="1"/>
+          </p:cNvSpPr>
+          <p:nvPr>
+            <p:ph idx="1"/>
+          </p:nvPr>
+        </p:nvSpPr>
+        <p:spPr>
+          <a:xfrm>
+            <a:off x="162064" y="1224404"/>
+            <a:ext cx="5933936" cy="5633596"/>
+          </a:xfrm>
+        </p:spPr>
+        <p:txBody>
+          <a:bodyPr/>
+          <a:lstStyle/>
+          <a:p>
+            <a:r>
+              <a:rPr lang="en-US" dirty="0"/>
+              <a:t>Hillsborough County, Florida, USA</a:t>
+            </a:r>
+          </a:p>
+          <a:p>
+            <a:r>
+              <a:rPr lang="en-US" dirty="0"/>
+              <a:t>3 cities</a:t>
+            </a:r>
+          </a:p>
+          <a:p>
+            <a:pPr lvl="1"/>
+            <a:r>
+              <a:rPr lang="en-US" dirty="0"/>
+              <a:t>Tampa</a:t>
+            </a:r>
+          </a:p>
+          <a:p>
+            <a:pPr lvl="1"/>
+            <a:r>
+              <a:rPr lang="en-US" dirty="0"/>
+              <a:t>Plant City</a:t>
+            </a:r>
+          </a:p>
+          <a:p>
+            <a:pPr lvl="1"/>
+            <a:r>
+              <a:rPr lang="en-US" dirty="0"/>
+              <a:t>Temple Terrace</a:t>
+            </a:r>
+          </a:p>
+          <a:p>
+            <a:r>
+              <a:rPr lang="en-US" dirty="0"/>
+              <a:t>Population</a:t>
+            </a:r>
+          </a:p>
+          <a:p>
+            <a:pPr lvl="1"/>
+            <a:r>
+              <a:rPr lang="en-US" dirty="0"/>
+              <a:t>July 2023: </a:t>
+            </a:r>
+            <a:r>
+              <a:rPr lang="en-US" b="1" dirty="0"/>
+              <a:t>1,535,564</a:t>
+            </a:r>
+            <a:r>
+              <a:rPr lang="en-US" dirty="0"/>
+              <a:t> (U.S. Census Bureau)</a:t>
+            </a:r>
+          </a:p>
+          <a:p>
+            <a:pPr lvl="1"/>
+            <a:r>
+              <a:rPr lang="en-US" dirty="0"/>
+              <a:t>2050 Estimate: </a:t>
+            </a:r>
+            <a:r>
+              <a:rPr lang="en-US" b="1" dirty="0"/>
+              <a:t>2,017,294</a:t>
+            </a:r>
+            <a:r>
+              <a:rPr lang="en-US" dirty="0"/>
+              <a:t> (Plan Hillsborough)</a:t>
+            </a:r>
+          </a:p>
+        </p:txBody>
+      </p:sp>
+      <p:pic>
+        <p:nvPicPr>
+          <p:cNvPr id="6" name="Picture 5" descr="A map of a city&#10;&#10;Description automatically generated">
+            <a:extLst>
+              <a:ext uri="{FF2B5EF4-FFF2-40B4-BE49-F238E27FC236}">
+                <a16:creationId xmlns:a16="http://schemas.microsoft.com/office/drawing/2014/main" id="{73F07F76-D9A7-B00B-28BE-CA945CDF76D3}"/>
+              </a:ext>
+            </a:extLst>
+          </p:cNvPr>
+          <p:cNvPicPr>
+            <a:picLocks noChangeAspect="1"/>
+          </p:cNvPicPr>
+          <p:nvPr/>
+        </p:nvPicPr>
+        <p:blipFill>
+          <a:blip r:embed="rId2"/>
+          <a:stretch>
+            <a:fillRect/>
+          </a:stretch>
+        </p:blipFill>
+        <p:spPr>
+          <a:xfrm>
+            <a:off x="6314936" y="1028700"/>
+            <a:ext cx="5715000" cy="5715000"/>
+          </a:xfrm>
+          <a:prstGeom prst="rect">
+            <a:avLst/>
+          </a:prstGeom>
+        </p:spPr>
+      </p:pic>
+    </p:spTree>
+    <p:extLst>
+      <p:ext uri="{BB962C8B-B14F-4D97-AF65-F5344CB8AC3E}">
+        <p14:creationId xmlns:p14="http://schemas.microsoft.com/office/powerpoint/2010/main" val="2429409189"/>
+      </p:ext>
+    </p:extLst>
+  </p:cSld>
+  <p:clrMapOvr>
+    <a:masterClrMapping/>
+  </p:clrMapOvr>
+</p:sld>
+</file>
+
+<file path=ppt/slides/slide4.xml><?xml version="1.0" encoding="utf-8"?>
+<p:sld xmlns:a="http://schemas.openxmlformats.org/drawingml/2006/main" xmlns:r="http://schemas.openxmlformats.org/officeDocument/2006/relationships" xmlns:p="http://schemas.openxmlformats.org/presentationml/2006/main">
+  <p:cSld>
+    <p:spTree>
+      <p:nvGrpSpPr>
+        <p:cNvPr id="1" name=""/>
+        <p:cNvGrpSpPr/>
+        <p:nvPr/>
+      </p:nvGrpSpPr>
+      <p:grpSpPr>
+        <a:xfrm>
+          <a:off x="0" y="0"/>
+          <a:ext cx="0" cy="0"/>
+          <a:chOff x="0" y="0"/>
+          <a:chExt cx="0" cy="0"/>
+        </a:xfrm>
+      </p:grpSpPr>
+      <p:sp>
+        <p:nvSpPr>
+          <p:cNvPr id="2" name="Title 1">
+            <a:extLst>
+              <a:ext uri="{FF2B5EF4-FFF2-40B4-BE49-F238E27FC236}">
+                <a16:creationId xmlns:a16="http://schemas.microsoft.com/office/drawing/2014/main" id="{548B87B9-445C-4013-ED38-AA83EF98FA26}"/>
+              </a:ext>
+            </a:extLst>
+          </p:cNvPr>
+          <p:cNvSpPr>
+            <a:spLocks noGrp="1"/>
+          </p:cNvSpPr>
+          <p:nvPr>
+            <p:ph type="title"/>
+          </p:nvPr>
+        </p:nvSpPr>
+        <p:spPr>
+          <a:xfrm>
+            <a:off x="0" y="0"/>
+            <a:ext cx="12192000" cy="914400"/>
+          </a:xfrm>
+          <a:solidFill>
+            <a:schemeClr val="tx2">
+              <a:lumMod val="10000"/>
+              <a:lumOff val="90000"/>
+            </a:schemeClr>
+          </a:solidFill>
+          <a:ln>
+            <a:noFill/>
+          </a:ln>
+        </p:spPr>
+        <p:style>
+          <a:lnRef idx="1">
+            <a:schemeClr val="accent1"/>
+          </a:lnRef>
+          <a:fillRef idx="2">
+            <a:schemeClr val="accent1"/>
+          </a:fillRef>
+          <a:effectRef idx="1">
+            <a:schemeClr val="accent1"/>
+          </a:effectRef>
+          <a:fontRef idx="minor">
+            <a:schemeClr val="dk1"/>
+          </a:fontRef>
+        </p:style>
+        <p:txBody>
+          <a:bodyPr>
+            <a:normAutofit/>
+          </a:bodyPr>
+          <a:lstStyle/>
+          <a:p>
+            <a:pPr algn="ctr"/>
+            <a:r>
+              <a:rPr lang="en-US" b="1" dirty="0">
+                <a:solidFill>
+                  <a:srgbClr val="002060"/>
+                </a:solidFill>
+              </a:rPr>
               <a:t>Crash Locations</a:t>
             </a:r>
           </a:p>
@@ -4035,7 +4509,12 @@
             <p:ph idx="1"/>
           </p:nvPr>
         </p:nvSpPr>
-        <p:spPr/>
+        <p:spPr>
+          <a:xfrm>
+            <a:off x="838200" y="1833259"/>
+            <a:ext cx="10515600" cy="4343703"/>
+          </a:xfrm>
+        </p:spPr>
         <p:txBody>
           <a:bodyPr/>
           <a:lstStyle/>
@@ -4057,7 +4536,7 @@
 </p:sld>
 </file>
 
-<file path=ppt/slides/slide4.xml><?xml version="1.0" encoding="utf-8"?>
+<file path=ppt/slides/slide5.xml><?xml version="1.0" encoding="utf-8"?>
 <p:sld xmlns:a="http://schemas.openxmlformats.org/drawingml/2006/main" xmlns:r="http://schemas.openxmlformats.org/officeDocument/2006/relationships" xmlns:p="http://schemas.openxmlformats.org/presentationml/2006/main">
   <p:cSld>
     <p:spTree>
@@ -5839,7 +6318,7 @@
 </p:sld>
 </file>
 
-<file path=ppt/slides/slide5.xml><?xml version="1.0" encoding="utf-8"?>
+<file path=ppt/slides/slide6.xml><?xml version="1.0" encoding="utf-8"?>
 <p:sld xmlns:a="http://schemas.openxmlformats.org/drawingml/2006/main" xmlns:r="http://schemas.openxmlformats.org/officeDocument/2006/relationships" xmlns:p="http://schemas.openxmlformats.org/presentationml/2006/main">
   <p:cSld>
     <p:spTree>
@@ -5919,8 +6398,8 @@
           </a:p>
         </p:txBody>
       </p:sp>
-      <mc:AlternateContent xmlns:mc="http://schemas.openxmlformats.org/markup-compatibility/2006">
-        <mc:Choice xmlns:a14="http://schemas.microsoft.com/office/drawing/2010/main" Requires="a14">
+      <mc:AlternateContent xmlns:mc="http://schemas.openxmlformats.org/markup-compatibility/2006" xmlns:a14="http://schemas.microsoft.com/office/drawing/2010/main">
+        <mc:Choice Requires="a14">
           <p:sp>
             <p:nvSpPr>
               <p:cNvPr id="3" name="Content Placeholder 2">
@@ -6219,7 +6698,7 @@
             </p:txBody>
           </p:sp>
         </mc:Choice>
-        <mc:Fallback>
+        <mc:Fallback xmlns="">
           <p:sp>
             <p:nvSpPr>
               <p:cNvPr id="3" name="Content Placeholder 2">
@@ -6272,7 +6751,7 @@
 </p:sld>
 </file>
 
-<file path=ppt/slides/slide6.xml><?xml version="1.0" encoding="utf-8"?>
+<file path=ppt/slides/slide7.xml><?xml version="1.0" encoding="utf-8"?>
 <p:sld xmlns:a="http://schemas.openxmlformats.org/drawingml/2006/main" xmlns:r="http://schemas.openxmlformats.org/officeDocument/2006/relationships" xmlns:p="http://schemas.openxmlformats.org/presentationml/2006/main">
   <p:cSld>
     <p:spTree>
@@ -6995,7 +7474,7 @@
 </p:sld>
 </file>
 
-<file path=ppt/slides/slide7.xml><?xml version="1.0" encoding="utf-8"?>
+<file path=ppt/slides/slide8.xml><?xml version="1.0" encoding="utf-8"?>
 <p:sld xmlns:a="http://schemas.openxmlformats.org/drawingml/2006/main" xmlns:r="http://schemas.openxmlformats.org/officeDocument/2006/relationships" xmlns:p="http://schemas.openxmlformats.org/presentationml/2006/main">
   <p:cSld>
     <p:spTree>
@@ -7184,7 +7663,7 @@
 </p:sld>
 </file>
 
-<file path=ppt/slides/slide8.xml><?xml version="1.0" encoding="utf-8"?>
+<file path=ppt/slides/slide9.xml><?xml version="1.0" encoding="utf-8"?>
 <p:sld xmlns:a="http://schemas.openxmlformats.org/drawingml/2006/main" xmlns:r="http://schemas.openxmlformats.org/officeDocument/2006/relationships" xmlns:p="http://schemas.openxmlformats.org/presentationml/2006/main">
   <p:cSld>
     <p:spTree>
@@ -7371,144 +7850,6 @@
     <p:extLst>
       <p:ext uri="{BB962C8B-B14F-4D97-AF65-F5344CB8AC3E}">
         <p14:creationId xmlns:p14="http://schemas.microsoft.com/office/powerpoint/2010/main" val="3469330905"/>
-      </p:ext>
-    </p:extLst>
-  </p:cSld>
-  <p:clrMapOvr>
-    <a:masterClrMapping/>
-  </p:clrMapOvr>
-</p:sld>
-</file>
-
-<file path=ppt/slides/slide9.xml><?xml version="1.0" encoding="utf-8"?>
-<p:sld xmlns:a="http://schemas.openxmlformats.org/drawingml/2006/main" xmlns:r="http://schemas.openxmlformats.org/officeDocument/2006/relationships" xmlns:p="http://schemas.openxmlformats.org/presentationml/2006/main">
-  <p:cSld>
-    <p:spTree>
-      <p:nvGrpSpPr>
-        <p:cNvPr id="1" name=""/>
-        <p:cNvGrpSpPr/>
-        <p:nvPr/>
-      </p:nvGrpSpPr>
-      <p:grpSpPr>
-        <a:xfrm>
-          <a:off x="0" y="0"/>
-          <a:ext cx="0" cy="0"/>
-          <a:chOff x="0" y="0"/>
-          <a:chExt cx="0" cy="0"/>
-        </a:xfrm>
-      </p:grpSpPr>
-      <p:sp>
-        <p:nvSpPr>
-          <p:cNvPr id="2" name="Title 1">
-            <a:extLst>
-              <a:ext uri="{FF2B5EF4-FFF2-40B4-BE49-F238E27FC236}">
-                <a16:creationId xmlns:a16="http://schemas.microsoft.com/office/drawing/2014/main" id="{548B87B9-445C-4013-ED38-AA83EF98FA26}"/>
-              </a:ext>
-            </a:extLst>
-          </p:cNvPr>
-          <p:cNvSpPr>
-            <a:spLocks noGrp="1"/>
-          </p:cNvSpPr>
-          <p:nvPr>
-            <p:ph type="title"/>
-          </p:nvPr>
-        </p:nvSpPr>
-        <p:spPr>
-          <a:xfrm>
-            <a:off x="0" y="0"/>
-            <a:ext cx="12192000" cy="914400"/>
-          </a:xfrm>
-          <a:solidFill>
-            <a:schemeClr val="tx2">
-              <a:lumMod val="10000"/>
-              <a:lumOff val="90000"/>
-            </a:schemeClr>
-          </a:solidFill>
-          <a:ln>
-            <a:noFill/>
-          </a:ln>
-        </p:spPr>
-        <p:style>
-          <a:lnRef idx="1">
-            <a:schemeClr val="accent1"/>
-          </a:lnRef>
-          <a:fillRef idx="2">
-            <a:schemeClr val="accent1"/>
-          </a:fillRef>
-          <a:effectRef idx="1">
-            <a:schemeClr val="accent1"/>
-          </a:effectRef>
-          <a:fontRef idx="minor">
-            <a:schemeClr val="dk1"/>
-          </a:fontRef>
-        </p:style>
-        <p:txBody>
-          <a:bodyPr>
-            <a:normAutofit/>
-          </a:bodyPr>
-          <a:lstStyle/>
-          <a:p>
-            <a:pPr algn="ctr"/>
-            <a:r>
-              <a:rPr lang="en-US" b="1" dirty="0">
-                <a:solidFill>
-                  <a:srgbClr val="002060"/>
-                </a:solidFill>
-              </a:rPr>
-              <a:t>Challenges</a:t>
-            </a:r>
-          </a:p>
-        </p:txBody>
-      </p:sp>
-      <p:sp>
-        <p:nvSpPr>
-          <p:cNvPr id="3" name="Content Placeholder 2">
-            <a:extLst>
-              <a:ext uri="{FF2B5EF4-FFF2-40B4-BE49-F238E27FC236}">
-                <a16:creationId xmlns:a16="http://schemas.microsoft.com/office/drawing/2014/main" id="{00AF6D0E-3160-7B0C-A696-D9E4E341928F}"/>
-              </a:ext>
-            </a:extLst>
-          </p:cNvPr>
-          <p:cNvSpPr>
-            <a:spLocks noGrp="1"/>
-          </p:cNvSpPr>
-          <p:nvPr>
-            <p:ph idx="1"/>
-          </p:nvPr>
-        </p:nvSpPr>
-        <p:spPr/>
-        <p:txBody>
-          <a:bodyPr/>
-          <a:lstStyle/>
-          <a:p>
-            <a:r>
-              <a:rPr lang="en-US" dirty="0"/>
-              <a:t>Unbalanced data</a:t>
-            </a:r>
-          </a:p>
-          <a:p>
-            <a:pPr lvl="1"/>
-            <a:r>
-              <a:rPr lang="en-US" dirty="0"/>
-              <a:t>1,083 Incapacitating (2.5%) and 42,877 Incapacitating (97.5%)</a:t>
-            </a:r>
-          </a:p>
-          <a:p>
-            <a:pPr lvl="1"/>
-            <a:r>
-              <a:rPr lang="en-US" dirty="0"/>
-              <a:t>Randomly Over Sampling Examples (ROSE) balances data by synthetically sampling training data</a:t>
-            </a:r>
-          </a:p>
-          <a:p>
-            <a:endParaRPr lang="en-US" dirty="0"/>
-          </a:p>
-        </p:txBody>
-      </p:sp>
-    </p:spTree>
-    <p:extLst>
-      <p:ext uri="{BB962C8B-B14F-4D97-AF65-F5344CB8AC3E}">
-        <p14:creationId xmlns:p14="http://schemas.microsoft.com/office/powerpoint/2010/main" val="264639234"/>
       </p:ext>
     </p:extLst>
   </p:cSld>

</xml_diff>

<commit_message>
added speaker notes and pd ppt
</commit_message>
<xml_diff>
--- a/PredictiveCrashAnalysis.pptx
+++ b/PredictiveCrashAnalysis.pptx
@@ -5,7 +5,7 @@
     <p:sldMasterId id="2147484111" r:id="rId1"/>
   </p:sldMasterIdLst>
   <p:notesMasterIdLst>
-    <p:notesMasterId r:id="rId17"/>
+    <p:notesMasterId r:id="rId16"/>
   </p:notesMasterIdLst>
   <p:sldIdLst>
     <p:sldId id="256" r:id="rId2"/>
@@ -22,7 +22,6 @@
     <p:sldId id="267" r:id="rId13"/>
     <p:sldId id="268" r:id="rId14"/>
     <p:sldId id="274" r:id="rId15"/>
-    <p:sldId id="277" r:id="rId16"/>
   </p:sldIdLst>
   <p:sldSz cx="12192000" cy="6858000"/>
   <p:notesSz cx="6858000" cy="9144000"/>
@@ -143,8 +142,8 @@
 <file path=ppt/revisionInfo.xml><?xml version="1.0" encoding="utf-8"?>
 <p1510:revInfo xmlns:a="http://schemas.openxmlformats.org/drawingml/2006/main" xmlns:r="http://schemas.openxmlformats.org/officeDocument/2006/relationships" xmlns:p1510="http://schemas.microsoft.com/office/powerpoint/2015/10/main">
   <p1510:revLst>
-    <p1510:client id="{41A97A1D-EC13-46E0-AEE7-1D226BE77F84}" v="10" dt="2024-03-28T13:19:56.907"/>
     <p1510:client id="{5DA2D69D-E71F-1C40-B828-C882C09DB046}" v="114" dt="2024-03-29T06:03:12.689"/>
+    <p1510:client id="{722DB55E-0DEA-564B-8613-7AE7069066E9}" v="13" dt="2024-03-29T20:20:52.841"/>
   </p1510:revLst>
 </p1510:revInfo>
 </file>
@@ -1100,6 +1099,200 @@
       </pc:sldChg>
     </pc:docChg>
   </pc:docChgLst>
+  <pc:docChgLst>
+    <pc:chgData name="Fethe, Bo J" userId="5645b770-a023-4ba0-b1b0-9cb089426b59" providerId="ADAL" clId="{722DB55E-0DEA-564B-8613-7AE7069066E9}"/>
+    <pc:docChg chg="undo custSel delSld modSld modNotesMaster">
+      <pc:chgData name="Fethe, Bo J" userId="5645b770-a023-4ba0-b1b0-9cb089426b59" providerId="ADAL" clId="{722DB55E-0DEA-564B-8613-7AE7069066E9}" dt="2024-03-29T20:20:44.306" v="12734" actId="3626"/>
+      <pc:docMkLst>
+        <pc:docMk/>
+      </pc:docMkLst>
+      <pc:sldChg chg="modSp mod modNotesTx">
+        <pc:chgData name="Fethe, Bo J" userId="5645b770-a023-4ba0-b1b0-9cb089426b59" providerId="ADAL" clId="{722DB55E-0DEA-564B-8613-7AE7069066E9}" dt="2024-03-29T20:06:15.700" v="12718" actId="113"/>
+        <pc:sldMkLst>
+          <pc:docMk/>
+          <pc:sldMk cId="3157146444" sldId="256"/>
+        </pc:sldMkLst>
+        <pc:spChg chg="mod">
+          <ac:chgData name="Fethe, Bo J" userId="5645b770-a023-4ba0-b1b0-9cb089426b59" providerId="ADAL" clId="{722DB55E-0DEA-564B-8613-7AE7069066E9}" dt="2024-03-29T20:06:15.700" v="12718" actId="113"/>
+          <ac:spMkLst>
+            <pc:docMk/>
+            <pc:sldMk cId="3157146444" sldId="256"/>
+            <ac:spMk id="3" creationId="{05EEFEE4-A462-E411-9721-B88D336EBD59}"/>
+          </ac:spMkLst>
+        </pc:spChg>
+      </pc:sldChg>
+      <pc:sldChg chg="modSp mod modNotesTx">
+        <pc:chgData name="Fethe, Bo J" userId="5645b770-a023-4ba0-b1b0-9cb089426b59" providerId="ADAL" clId="{722DB55E-0DEA-564B-8613-7AE7069066E9}" dt="2024-03-29T17:45:08.609" v="1482" actId="20577"/>
+        <pc:sldMkLst>
+          <pc:docMk/>
+          <pc:sldMk cId="884458841" sldId="257"/>
+        </pc:sldMkLst>
+        <pc:spChg chg="mod">
+          <ac:chgData name="Fethe, Bo J" userId="5645b770-a023-4ba0-b1b0-9cb089426b59" providerId="ADAL" clId="{722DB55E-0DEA-564B-8613-7AE7069066E9}" dt="2024-03-29T17:36:44.368" v="712" actId="20577"/>
+          <ac:spMkLst>
+            <pc:docMk/>
+            <pc:sldMk cId="884458841" sldId="257"/>
+            <ac:spMk id="3" creationId="{00AF6D0E-3160-7B0C-A696-D9E4E341928F}"/>
+          </ac:spMkLst>
+        </pc:spChg>
+      </pc:sldChg>
+      <pc:sldChg chg="modNotesTx">
+        <pc:chgData name="Fethe, Bo J" userId="5645b770-a023-4ba0-b1b0-9cb089426b59" providerId="ADAL" clId="{722DB55E-0DEA-564B-8613-7AE7069066E9}" dt="2024-03-29T18:13:15.901" v="3374" actId="20577"/>
+        <pc:sldMkLst>
+          <pc:docMk/>
+          <pc:sldMk cId="1000747123" sldId="264"/>
+        </pc:sldMkLst>
+      </pc:sldChg>
+      <pc:sldChg chg="modSp mod modNotesTx">
+        <pc:chgData name="Fethe, Bo J" userId="5645b770-a023-4ba0-b1b0-9cb089426b59" providerId="ADAL" clId="{722DB55E-0DEA-564B-8613-7AE7069066E9}" dt="2024-03-29T20:08:24.695" v="12722" actId="108"/>
+        <pc:sldMkLst>
+          <pc:docMk/>
+          <pc:sldMk cId="3433270664" sldId="265"/>
+        </pc:sldMkLst>
+        <pc:spChg chg="mod">
+          <ac:chgData name="Fethe, Bo J" userId="5645b770-a023-4ba0-b1b0-9cb089426b59" providerId="ADAL" clId="{722DB55E-0DEA-564B-8613-7AE7069066E9}" dt="2024-03-29T18:09:25.210" v="3086" actId="313"/>
+          <ac:spMkLst>
+            <pc:docMk/>
+            <pc:sldMk cId="3433270664" sldId="265"/>
+            <ac:spMk id="3" creationId="{00AF6D0E-3160-7B0C-A696-D9E4E341928F}"/>
+          </ac:spMkLst>
+        </pc:spChg>
+      </pc:sldChg>
+      <pc:sldChg chg="modNotesTx">
+        <pc:chgData name="Fethe, Bo J" userId="5645b770-a023-4ba0-b1b0-9cb089426b59" providerId="ADAL" clId="{722DB55E-0DEA-564B-8613-7AE7069066E9}" dt="2024-03-29T19:40:01.227" v="10640" actId="20577"/>
+        <pc:sldMkLst>
+          <pc:docMk/>
+          <pc:sldMk cId="3595759910" sldId="267"/>
+        </pc:sldMkLst>
+      </pc:sldChg>
+      <pc:sldChg chg="modSp mod modNotesTx">
+        <pc:chgData name="Fethe, Bo J" userId="5645b770-a023-4ba0-b1b0-9cb089426b59" providerId="ADAL" clId="{722DB55E-0DEA-564B-8613-7AE7069066E9}" dt="2024-03-29T19:54:40.357" v="12011" actId="20577"/>
+        <pc:sldMkLst>
+          <pc:docMk/>
+          <pc:sldMk cId="3898302957" sldId="268"/>
+        </pc:sldMkLst>
+        <pc:spChg chg="mod">
+          <ac:chgData name="Fethe, Bo J" userId="5645b770-a023-4ba0-b1b0-9cb089426b59" providerId="ADAL" clId="{722DB55E-0DEA-564B-8613-7AE7069066E9}" dt="2024-03-29T19:49:50.415" v="11400" actId="20577"/>
+          <ac:spMkLst>
+            <pc:docMk/>
+            <pc:sldMk cId="3898302957" sldId="268"/>
+            <ac:spMk id="3" creationId="{00AF6D0E-3160-7B0C-A696-D9E4E341928F}"/>
+          </ac:spMkLst>
+        </pc:spChg>
+      </pc:sldChg>
+      <pc:sldChg chg="modNotesTx">
+        <pc:chgData name="Fethe, Bo J" userId="5645b770-a023-4ba0-b1b0-9cb089426b59" providerId="ADAL" clId="{722DB55E-0DEA-564B-8613-7AE7069066E9}" dt="2024-03-29T18:26:57.694" v="4640" actId="20577"/>
+        <pc:sldMkLst>
+          <pc:docMk/>
+          <pc:sldMk cId="1473603429" sldId="269"/>
+        </pc:sldMkLst>
+      </pc:sldChg>
+      <pc:sldChg chg="modNotesTx">
+        <pc:chgData name="Fethe, Bo J" userId="5645b770-a023-4ba0-b1b0-9cb089426b59" providerId="ADAL" clId="{722DB55E-0DEA-564B-8613-7AE7069066E9}" dt="2024-03-29T19:18:15.023" v="8673" actId="20577"/>
+        <pc:sldMkLst>
+          <pc:docMk/>
+          <pc:sldMk cId="1531540487" sldId="270"/>
+        </pc:sldMkLst>
+      </pc:sldChg>
+      <pc:sldChg chg="modSp mod modNotesTx">
+        <pc:chgData name="Fethe, Bo J" userId="5645b770-a023-4ba0-b1b0-9cb089426b59" providerId="ADAL" clId="{722DB55E-0DEA-564B-8613-7AE7069066E9}" dt="2024-03-29T19:27:04.375" v="9347" actId="20577"/>
+        <pc:sldMkLst>
+          <pc:docMk/>
+          <pc:sldMk cId="3469330905" sldId="271"/>
+        </pc:sldMkLst>
+        <pc:spChg chg="mod">
+          <ac:chgData name="Fethe, Bo J" userId="5645b770-a023-4ba0-b1b0-9cb089426b59" providerId="ADAL" clId="{722DB55E-0DEA-564B-8613-7AE7069066E9}" dt="2024-03-29T19:26:49.188" v="9345"/>
+          <ac:spMkLst>
+            <pc:docMk/>
+            <pc:sldMk cId="3469330905" sldId="271"/>
+            <ac:spMk id="3" creationId="{00AF6D0E-3160-7B0C-A696-D9E4E341928F}"/>
+          </ac:spMkLst>
+        </pc:spChg>
+      </pc:sldChg>
+      <pc:sldChg chg="modNotesTx">
+        <pc:chgData name="Fethe, Bo J" userId="5645b770-a023-4ba0-b1b0-9cb089426b59" providerId="ADAL" clId="{722DB55E-0DEA-564B-8613-7AE7069066E9}" dt="2024-03-29T19:11:58.330" v="8088" actId="313"/>
+        <pc:sldMkLst>
+          <pc:docMk/>
+          <pc:sldMk cId="2591618836" sldId="272"/>
+        </pc:sldMkLst>
+      </pc:sldChg>
+      <pc:sldChg chg="modNotesTx">
+        <pc:chgData name="Fethe, Bo J" userId="5645b770-a023-4ba0-b1b0-9cb089426b59" providerId="ADAL" clId="{722DB55E-0DEA-564B-8613-7AE7069066E9}" dt="2024-03-29T17:59:19.369" v="1972" actId="20577"/>
+        <pc:sldMkLst>
+          <pc:docMk/>
+          <pc:sldMk cId="2429409189" sldId="273"/>
+        </pc:sldMkLst>
+      </pc:sldChg>
+      <pc:sldChg chg="addSp modSp mod modNotesTx">
+        <pc:chgData name="Fethe, Bo J" userId="5645b770-a023-4ba0-b1b0-9cb089426b59" providerId="ADAL" clId="{722DB55E-0DEA-564B-8613-7AE7069066E9}" dt="2024-03-29T20:20:44.306" v="12734" actId="3626"/>
+        <pc:sldMkLst>
+          <pc:docMk/>
+          <pc:sldMk cId="1142648994" sldId="274"/>
+        </pc:sldMkLst>
+        <pc:spChg chg="add mod">
+          <ac:chgData name="Fethe, Bo J" userId="5645b770-a023-4ba0-b1b0-9cb089426b59" providerId="ADAL" clId="{722DB55E-0DEA-564B-8613-7AE7069066E9}" dt="2024-03-29T20:01:34.932" v="12382" actId="1076"/>
+          <ac:spMkLst>
+            <pc:docMk/>
+            <pc:sldMk cId="1142648994" sldId="274"/>
+            <ac:spMk id="3" creationId="{074A7335-6A0C-68E5-E000-323A37A81ED9}"/>
+          </ac:spMkLst>
+        </pc:spChg>
+        <pc:spChg chg="mod">
+          <ac:chgData name="Fethe, Bo J" userId="5645b770-a023-4ba0-b1b0-9cb089426b59" providerId="ADAL" clId="{722DB55E-0DEA-564B-8613-7AE7069066E9}" dt="2024-03-29T20:20:44.306" v="12734" actId="3626"/>
+          <ac:spMkLst>
+            <pc:docMk/>
+            <pc:sldMk cId="1142648994" sldId="274"/>
+            <ac:spMk id="7" creationId="{8FA8FC74-6534-D34B-25E3-CF7F6CA60037}"/>
+          </ac:spMkLst>
+        </pc:spChg>
+        <pc:spChg chg="mod">
+          <ac:chgData name="Fethe, Bo J" userId="5645b770-a023-4ba0-b1b0-9cb089426b59" providerId="ADAL" clId="{722DB55E-0DEA-564B-8613-7AE7069066E9}" dt="2024-03-29T20:20:12.381" v="12733" actId="113"/>
+          <ac:spMkLst>
+            <pc:docMk/>
+            <pc:sldMk cId="1142648994" sldId="274"/>
+            <ac:spMk id="8" creationId="{A6A61FB9-7840-EC44-A570-C990AC228ADA}"/>
+          </ac:spMkLst>
+        </pc:spChg>
+        <pc:picChg chg="mod">
+          <ac:chgData name="Fethe, Bo J" userId="5645b770-a023-4ba0-b1b0-9cb089426b59" providerId="ADAL" clId="{722DB55E-0DEA-564B-8613-7AE7069066E9}" dt="2024-03-29T20:00:30.468" v="12359" actId="1076"/>
+          <ac:picMkLst>
+            <pc:docMk/>
+            <pc:sldMk cId="1142648994" sldId="274"/>
+            <ac:picMk id="5" creationId="{2D671726-5D13-2397-A4EE-1500DCF9A3A6}"/>
+          </ac:picMkLst>
+        </pc:picChg>
+        <pc:picChg chg="mod">
+          <ac:chgData name="Fethe, Bo J" userId="5645b770-a023-4ba0-b1b0-9cb089426b59" providerId="ADAL" clId="{722DB55E-0DEA-564B-8613-7AE7069066E9}" dt="2024-03-29T20:00:30.468" v="12359" actId="1076"/>
+          <ac:picMkLst>
+            <pc:docMk/>
+            <pc:sldMk cId="1142648994" sldId="274"/>
+            <ac:picMk id="6" creationId="{C239DB4B-D413-B49E-86C4-1E0568279CB7}"/>
+          </ac:picMkLst>
+        </pc:picChg>
+      </pc:sldChg>
+      <pc:sldChg chg="modNotesTx">
+        <pc:chgData name="Fethe, Bo J" userId="5645b770-a023-4ba0-b1b0-9cb089426b59" providerId="ADAL" clId="{722DB55E-0DEA-564B-8613-7AE7069066E9}" dt="2024-03-29T18:43:14.437" v="5711" actId="20577"/>
+        <pc:sldMkLst>
+          <pc:docMk/>
+          <pc:sldMk cId="3486102332" sldId="275"/>
+        </pc:sldMkLst>
+      </pc:sldChg>
+      <pc:sldChg chg="modNotesTx">
+        <pc:chgData name="Fethe, Bo J" userId="5645b770-a023-4ba0-b1b0-9cb089426b59" providerId="ADAL" clId="{722DB55E-0DEA-564B-8613-7AE7069066E9}" dt="2024-03-29T20:11:36.882" v="12726" actId="20577"/>
+        <pc:sldMkLst>
+          <pc:docMk/>
+          <pc:sldMk cId="855319290" sldId="276"/>
+        </pc:sldMkLst>
+      </pc:sldChg>
+      <pc:sldChg chg="del">
+        <pc:chgData name="Fethe, Bo J" userId="5645b770-a023-4ba0-b1b0-9cb089426b59" providerId="ADAL" clId="{722DB55E-0DEA-564B-8613-7AE7069066E9}" dt="2024-03-29T20:00:58.884" v="12362" actId="2696"/>
+        <pc:sldMkLst>
+          <pc:docMk/>
+          <pc:sldMk cId="571288211" sldId="277"/>
+        </pc:sldMkLst>
+      </pc:sldChg>
+    </pc:docChg>
+  </pc:docChgLst>
 </pc:chgInfo>
 </file>
 
@@ -1137,7 +1330,7 @@
         </p:nvSpPr>
         <p:spPr>
           <a:xfrm>
-            <a:off x="0" y="0"/>
+            <a:off x="0" y="1"/>
             <a:ext cx="2971800" cy="458788"/>
           </a:xfrm>
           <a:prstGeom prst="rect">
@@ -1168,7 +1361,7 @@
         </p:nvSpPr>
         <p:spPr>
           <a:xfrm>
-            <a:off x="3884613" y="0"/>
+            <a:off x="3884613" y="1"/>
             <a:ext cx="2971800" cy="458788"/>
           </a:xfrm>
           <a:prstGeom prst="rect">
@@ -1236,8 +1429,8 @@
         </p:nvSpPr>
         <p:spPr>
           <a:xfrm>
-            <a:off x="685800" y="4400550"/>
-            <a:ext cx="5486400" cy="3600450"/>
+            <a:off x="685800" y="4400549"/>
+            <a:ext cx="5486400" cy="3600451"/>
           </a:xfrm>
           <a:prstGeom prst="rect">
             <a:avLst/>
@@ -1496,7 +1689,1211 @@
           <a:bodyPr/>
           <a:lstStyle/>
           <a:p>
-            <a:endParaRPr lang="en-US" dirty="0"/>
+            <a:r>
+              <a:rPr lang="en-US" dirty="0"/>
+              <a:t>Hello everyone.  My name is Bo and I am a Solutions Engineer at Hillsborough County. Today, I am going to share a project I worked on analyzing and predicting crash data in Hillsborough County.</a:t>
+            </a:r>
+          </a:p>
+        </p:txBody>
+      </p:sp>
+      <p:sp>
+        <p:nvSpPr>
+          <p:cNvPr id="4" name="Slide Number Placeholder 3"/>
+          <p:cNvSpPr>
+            <a:spLocks noGrp="1"/>
+          </p:cNvSpPr>
+          <p:nvPr>
+            <p:ph type="sldNum" sz="quarter" idx="5"/>
+          </p:nvPr>
+        </p:nvSpPr>
+        <p:spPr/>
+        <p:txBody>
+          <a:bodyPr/>
+          <a:lstStyle/>
+          <a:p>
+            <a:fld id="{E627D67B-A2BE-8441-98D1-15A3A731A8EA}" type="slidenum">
+              <a:rPr lang="en-US" smtClean="0"/>
+              <a:t>1</a:t>
+            </a:fld>
+            <a:endParaRPr lang="en-US"/>
+          </a:p>
+        </p:txBody>
+      </p:sp>
+    </p:spTree>
+    <p:extLst>
+      <p:ext uri="{BB962C8B-B14F-4D97-AF65-F5344CB8AC3E}">
+        <p14:creationId xmlns:p14="http://schemas.microsoft.com/office/powerpoint/2010/main" val="2413691410"/>
+      </p:ext>
+    </p:extLst>
+  </p:cSld>
+  <p:clrMapOvr>
+    <a:masterClrMapping/>
+  </p:clrMapOvr>
+</p:notes>
+</file>
+
+<file path=ppt/notesSlides/notesSlide10.xml><?xml version="1.0" encoding="utf-8"?>
+<p:notes xmlns:a="http://schemas.openxmlformats.org/drawingml/2006/main" xmlns:r="http://schemas.openxmlformats.org/officeDocument/2006/relationships" xmlns:p="http://schemas.openxmlformats.org/presentationml/2006/main">
+  <p:cSld>
+    <p:spTree>
+      <p:nvGrpSpPr>
+        <p:cNvPr id="1" name=""/>
+        <p:cNvGrpSpPr/>
+        <p:nvPr/>
+      </p:nvGrpSpPr>
+      <p:grpSpPr>
+        <a:xfrm>
+          <a:off x="0" y="0"/>
+          <a:ext cx="0" cy="0"/>
+          <a:chOff x="0" y="0"/>
+          <a:chExt cx="0" cy="0"/>
+        </a:xfrm>
+      </p:grpSpPr>
+      <p:sp>
+        <p:nvSpPr>
+          <p:cNvPr id="2" name="Slide Image Placeholder 1"/>
+          <p:cNvSpPr>
+            <a:spLocks noGrp="1" noRot="1" noChangeAspect="1"/>
+          </p:cNvSpPr>
+          <p:nvPr>
+            <p:ph type="sldImg"/>
+          </p:nvPr>
+        </p:nvSpPr>
+        <p:spPr/>
+      </p:sp>
+      <p:sp>
+        <p:nvSpPr>
+          <p:cNvPr id="3" name="Notes Placeholder 2"/>
+          <p:cNvSpPr>
+            <a:spLocks noGrp="1"/>
+          </p:cNvSpPr>
+          <p:nvPr>
+            <p:ph type="body" idx="1"/>
+          </p:nvPr>
+        </p:nvSpPr>
+        <p:spPr/>
+        <p:txBody>
+          <a:bodyPr/>
+          <a:lstStyle/>
+          <a:p>
+            <a:r>
+              <a:rPr lang="en-US" dirty="0"/>
+              <a:t>The next 2 models are called ensemble methods because they combine the results of multiple models into 1 result. Random forests are a bagging algorithm that bootstraps many independent decision trees and aggregates the results by taking the average or mode. This is suitable for handling large datasets with high dimensionality and can be done in R using the </a:t>
+            </a:r>
+            <a:r>
+              <a:rPr lang="en-US" dirty="0" err="1"/>
+              <a:t>randomForest</a:t>
+            </a:r>
+            <a:r>
+              <a:rPr lang="en-US" dirty="0"/>
+              <a:t>() function.</a:t>
+            </a:r>
+          </a:p>
+        </p:txBody>
+      </p:sp>
+      <p:sp>
+        <p:nvSpPr>
+          <p:cNvPr id="4" name="Slide Number Placeholder 3"/>
+          <p:cNvSpPr>
+            <a:spLocks noGrp="1"/>
+          </p:cNvSpPr>
+          <p:nvPr>
+            <p:ph type="sldNum" sz="quarter" idx="5"/>
+          </p:nvPr>
+        </p:nvSpPr>
+        <p:spPr/>
+        <p:txBody>
+          <a:bodyPr/>
+          <a:lstStyle/>
+          <a:p>
+            <a:fld id="{E627D67B-A2BE-8441-98D1-15A3A731A8EA}" type="slidenum">
+              <a:rPr lang="en-US" smtClean="0"/>
+              <a:t>10</a:t>
+            </a:fld>
+            <a:endParaRPr lang="en-US"/>
+          </a:p>
+        </p:txBody>
+      </p:sp>
+    </p:spTree>
+    <p:extLst>
+      <p:ext uri="{BB962C8B-B14F-4D97-AF65-F5344CB8AC3E}">
+        <p14:creationId xmlns:p14="http://schemas.microsoft.com/office/powerpoint/2010/main" val="3507685349"/>
+      </p:ext>
+    </p:extLst>
+  </p:cSld>
+  <p:clrMapOvr>
+    <a:masterClrMapping/>
+  </p:clrMapOvr>
+</p:notes>
+</file>
+
+<file path=ppt/notesSlides/notesSlide11.xml><?xml version="1.0" encoding="utf-8"?>
+<p:notes xmlns:a="http://schemas.openxmlformats.org/drawingml/2006/main" xmlns:r="http://schemas.openxmlformats.org/officeDocument/2006/relationships" xmlns:p="http://schemas.openxmlformats.org/presentationml/2006/main">
+  <p:cSld>
+    <p:spTree>
+      <p:nvGrpSpPr>
+        <p:cNvPr id="1" name=""/>
+        <p:cNvGrpSpPr/>
+        <p:nvPr/>
+      </p:nvGrpSpPr>
+      <p:grpSpPr>
+        <a:xfrm>
+          <a:off x="0" y="0"/>
+          <a:ext cx="0" cy="0"/>
+          <a:chOff x="0" y="0"/>
+          <a:chExt cx="0" cy="0"/>
+        </a:xfrm>
+      </p:grpSpPr>
+      <p:sp>
+        <p:nvSpPr>
+          <p:cNvPr id="2" name="Slide Image Placeholder 1"/>
+          <p:cNvSpPr>
+            <a:spLocks noGrp="1" noRot="1" noChangeAspect="1"/>
+          </p:cNvSpPr>
+          <p:nvPr>
+            <p:ph type="sldImg"/>
+          </p:nvPr>
+        </p:nvSpPr>
+        <p:spPr/>
+      </p:sp>
+      <p:sp>
+        <p:nvSpPr>
+          <p:cNvPr id="3" name="Notes Placeholder 2"/>
+          <p:cNvSpPr>
+            <a:spLocks noGrp="1"/>
+          </p:cNvSpPr>
+          <p:nvPr>
+            <p:ph type="body" idx="1"/>
+          </p:nvPr>
+        </p:nvSpPr>
+        <p:spPr/>
+        <p:txBody>
+          <a:bodyPr/>
+          <a:lstStyle/>
+          <a:p>
+            <a:r>
+              <a:rPr lang="en-US" dirty="0"/>
+              <a:t>Another ensemble algorithm is boosting, which is similar to random forest that iteratively builds decision trees, but instead of aggregating independent trees, it uses the previous results to train weak learners and improve each iteration. To find the optimal # of iterations for predicting, you can use cross-validation. This can improve accuracy and can be done in R using the </a:t>
+            </a:r>
+            <a:r>
+              <a:rPr lang="en-US" dirty="0" err="1"/>
+              <a:t>gbm</a:t>
+            </a:r>
+            <a:r>
+              <a:rPr lang="en-US" dirty="0"/>
+              <a:t>() function, but it also increases time spent in computation. </a:t>
+            </a:r>
+          </a:p>
+        </p:txBody>
+      </p:sp>
+      <p:sp>
+        <p:nvSpPr>
+          <p:cNvPr id="4" name="Slide Number Placeholder 3"/>
+          <p:cNvSpPr>
+            <a:spLocks noGrp="1"/>
+          </p:cNvSpPr>
+          <p:nvPr>
+            <p:ph type="sldNum" sz="quarter" idx="5"/>
+          </p:nvPr>
+        </p:nvSpPr>
+        <p:spPr/>
+        <p:txBody>
+          <a:bodyPr/>
+          <a:lstStyle/>
+          <a:p>
+            <a:fld id="{E627D67B-A2BE-8441-98D1-15A3A731A8EA}" type="slidenum">
+              <a:rPr lang="en-US" smtClean="0"/>
+              <a:t>11</a:t>
+            </a:fld>
+            <a:endParaRPr lang="en-US"/>
+          </a:p>
+        </p:txBody>
+      </p:sp>
+    </p:spTree>
+    <p:extLst>
+      <p:ext uri="{BB962C8B-B14F-4D97-AF65-F5344CB8AC3E}">
+        <p14:creationId xmlns:p14="http://schemas.microsoft.com/office/powerpoint/2010/main" val="1141352858"/>
+      </p:ext>
+    </p:extLst>
+  </p:cSld>
+  <p:clrMapOvr>
+    <a:masterClrMapping/>
+  </p:clrMapOvr>
+</p:notes>
+</file>
+
+<file path=ppt/notesSlides/notesSlide12.xml><?xml version="1.0" encoding="utf-8"?>
+<p:notes xmlns:a="http://schemas.openxmlformats.org/drawingml/2006/main" xmlns:r="http://schemas.openxmlformats.org/officeDocument/2006/relationships" xmlns:p="http://schemas.openxmlformats.org/presentationml/2006/main">
+  <p:cSld>
+    <p:spTree>
+      <p:nvGrpSpPr>
+        <p:cNvPr id="1" name=""/>
+        <p:cNvGrpSpPr/>
+        <p:nvPr/>
+      </p:nvGrpSpPr>
+      <p:grpSpPr>
+        <a:xfrm>
+          <a:off x="0" y="0"/>
+          <a:ext cx="0" cy="0"/>
+          <a:chOff x="0" y="0"/>
+          <a:chExt cx="0" cy="0"/>
+        </a:xfrm>
+      </p:grpSpPr>
+      <p:sp>
+        <p:nvSpPr>
+          <p:cNvPr id="2" name="Slide Image Placeholder 1"/>
+          <p:cNvSpPr>
+            <a:spLocks noGrp="1" noRot="1" noChangeAspect="1"/>
+          </p:cNvSpPr>
+          <p:nvPr>
+            <p:ph type="sldImg"/>
+          </p:nvPr>
+        </p:nvSpPr>
+        <p:spPr/>
+      </p:sp>
+      <p:sp>
+        <p:nvSpPr>
+          <p:cNvPr id="3" name="Notes Placeholder 2"/>
+          <p:cNvSpPr>
+            <a:spLocks noGrp="1"/>
+          </p:cNvSpPr>
+          <p:nvPr>
+            <p:ph type="body" idx="1"/>
+          </p:nvPr>
+        </p:nvSpPr>
+        <p:spPr/>
+        <p:txBody>
+          <a:bodyPr/>
+          <a:lstStyle/>
+          <a:p>
+            <a:r>
+              <a:rPr lang="en-US" dirty="0"/>
+              <a:t>Now for the results.  The confusion matrices for each model are shown here with the diagonal showing the amount of correctly identified events. For an overall approach, the boosting model had the lowest testing error, meaning when considering all values for all classes, it performed the best. But there are cases where incorrect negative IDs can be costly, such as life-threatening events. This is where specificity becomes important. While the boosting model had the lowest test error, it really struggled with predicting true incapacitating events and got 4 correct and 117 wrong. Logistic regression had the worst testing error but outperformed the other 2 algorithms when predicting true incapacitating events. </a:t>
+            </a:r>
+          </a:p>
+        </p:txBody>
+      </p:sp>
+      <p:sp>
+        <p:nvSpPr>
+          <p:cNvPr id="4" name="Slide Number Placeholder 3"/>
+          <p:cNvSpPr>
+            <a:spLocks noGrp="1"/>
+          </p:cNvSpPr>
+          <p:nvPr>
+            <p:ph type="sldNum" sz="quarter" idx="5"/>
+          </p:nvPr>
+        </p:nvSpPr>
+        <p:spPr/>
+        <p:txBody>
+          <a:bodyPr/>
+          <a:lstStyle/>
+          <a:p>
+            <a:fld id="{E627D67B-A2BE-8441-98D1-15A3A731A8EA}" type="slidenum">
+              <a:rPr lang="en-US" smtClean="0"/>
+              <a:t>12</a:t>
+            </a:fld>
+            <a:endParaRPr lang="en-US"/>
+          </a:p>
+        </p:txBody>
+      </p:sp>
+    </p:spTree>
+    <p:extLst>
+      <p:ext uri="{BB962C8B-B14F-4D97-AF65-F5344CB8AC3E}">
+        <p14:creationId xmlns:p14="http://schemas.microsoft.com/office/powerpoint/2010/main" val="730371426"/>
+      </p:ext>
+    </p:extLst>
+  </p:cSld>
+  <p:clrMapOvr>
+    <a:masterClrMapping/>
+  </p:clrMapOvr>
+</p:notes>
+</file>
+
+<file path=ppt/notesSlides/notesSlide13.xml><?xml version="1.0" encoding="utf-8"?>
+<p:notes xmlns:a="http://schemas.openxmlformats.org/drawingml/2006/main" xmlns:r="http://schemas.openxmlformats.org/officeDocument/2006/relationships" xmlns:p="http://schemas.openxmlformats.org/presentationml/2006/main">
+  <p:cSld>
+    <p:spTree>
+      <p:nvGrpSpPr>
+        <p:cNvPr id="1" name=""/>
+        <p:cNvGrpSpPr/>
+        <p:nvPr/>
+      </p:nvGrpSpPr>
+      <p:grpSpPr>
+        <a:xfrm>
+          <a:off x="0" y="0"/>
+          <a:ext cx="0" cy="0"/>
+          <a:chOff x="0" y="0"/>
+          <a:chExt cx="0" cy="0"/>
+        </a:xfrm>
+      </p:grpSpPr>
+      <p:sp>
+        <p:nvSpPr>
+          <p:cNvPr id="2" name="Slide Image Placeholder 1"/>
+          <p:cNvSpPr>
+            <a:spLocks noGrp="1" noRot="1" noChangeAspect="1"/>
+          </p:cNvSpPr>
+          <p:nvPr>
+            <p:ph type="sldImg"/>
+          </p:nvPr>
+        </p:nvSpPr>
+        <p:spPr/>
+      </p:sp>
+      <p:sp>
+        <p:nvSpPr>
+          <p:cNvPr id="3" name="Notes Placeholder 2"/>
+          <p:cNvSpPr>
+            <a:spLocks noGrp="1"/>
+          </p:cNvSpPr>
+          <p:nvPr>
+            <p:ph type="body" idx="1"/>
+          </p:nvPr>
+        </p:nvSpPr>
+        <p:spPr/>
+        <p:txBody>
+          <a:bodyPr/>
+          <a:lstStyle/>
+          <a:p>
+            <a:r>
+              <a:rPr lang="en-US" dirty="0"/>
+              <a:t>Back to the question of how well machine learning can predict incapacitating events.  Can it? In short - yes. But it’s important to consider how you’re measuring efficiency.  Overall, boosting was the preferred method for predicting crashes, but struggled with life-threatening events. Logistic regression did better at predicting those life-threatening events, but overall didn’t do perform the best. This could be due to the handling of unbalanced data, or the lack of stronger predictors. For example: speeding involvement was incorporated as a binary classification, but going 5 mph over is very different than going 50 mph over. Additionally, in situations with costly consequences such as interacting with law enforcement, information may be withheld or fabricated for self protection.</a:t>
+            </a:r>
+          </a:p>
+        </p:txBody>
+      </p:sp>
+      <p:sp>
+        <p:nvSpPr>
+          <p:cNvPr id="4" name="Slide Number Placeholder 3"/>
+          <p:cNvSpPr>
+            <a:spLocks noGrp="1"/>
+          </p:cNvSpPr>
+          <p:nvPr>
+            <p:ph type="sldNum" sz="quarter" idx="5"/>
+          </p:nvPr>
+        </p:nvSpPr>
+        <p:spPr/>
+        <p:txBody>
+          <a:bodyPr/>
+          <a:lstStyle/>
+          <a:p>
+            <a:fld id="{E627D67B-A2BE-8441-98D1-15A3A731A8EA}" type="slidenum">
+              <a:rPr lang="en-US" smtClean="0"/>
+              <a:t>13</a:t>
+            </a:fld>
+            <a:endParaRPr lang="en-US"/>
+          </a:p>
+        </p:txBody>
+      </p:sp>
+    </p:spTree>
+    <p:extLst>
+      <p:ext uri="{BB962C8B-B14F-4D97-AF65-F5344CB8AC3E}">
+        <p14:creationId xmlns:p14="http://schemas.microsoft.com/office/powerpoint/2010/main" val="1489338402"/>
+      </p:ext>
+    </p:extLst>
+  </p:cSld>
+  <p:clrMapOvr>
+    <a:masterClrMapping/>
+  </p:clrMapOvr>
+</p:notes>
+</file>
+
+<file path=ppt/notesSlides/notesSlide14.xml><?xml version="1.0" encoding="utf-8"?>
+<p:notes xmlns:a="http://schemas.openxmlformats.org/drawingml/2006/main" xmlns:r="http://schemas.openxmlformats.org/officeDocument/2006/relationships" xmlns:p="http://schemas.openxmlformats.org/presentationml/2006/main">
+  <p:cSld>
+    <p:spTree>
+      <p:nvGrpSpPr>
+        <p:cNvPr id="1" name=""/>
+        <p:cNvGrpSpPr/>
+        <p:nvPr/>
+      </p:nvGrpSpPr>
+      <p:grpSpPr>
+        <a:xfrm>
+          <a:off x="0" y="0"/>
+          <a:ext cx="0" cy="0"/>
+          <a:chOff x="0" y="0"/>
+          <a:chExt cx="0" cy="0"/>
+        </a:xfrm>
+      </p:grpSpPr>
+      <p:sp>
+        <p:nvSpPr>
+          <p:cNvPr id="2" name="Slide Image Placeholder 1"/>
+          <p:cNvSpPr>
+            <a:spLocks noGrp="1" noRot="1" noChangeAspect="1"/>
+          </p:cNvSpPr>
+          <p:nvPr>
+            <p:ph type="sldImg"/>
+          </p:nvPr>
+        </p:nvSpPr>
+        <p:spPr/>
+      </p:sp>
+      <p:sp>
+        <p:nvSpPr>
+          <p:cNvPr id="3" name="Notes Placeholder 2"/>
+          <p:cNvSpPr>
+            <a:spLocks noGrp="1"/>
+          </p:cNvSpPr>
+          <p:nvPr>
+            <p:ph type="body" idx="1"/>
+          </p:nvPr>
+        </p:nvSpPr>
+        <p:spPr/>
+        <p:txBody>
+          <a:bodyPr/>
+          <a:lstStyle/>
+          <a:p>
+            <a:r>
+              <a:rPr lang="en-US" dirty="0"/>
+              <a:t>This concludes the presentation.  For more details, scan or click the links shown on this slide to view the data in an interactive map in ArcGIS Online, or view the code used for this analysis in the project’s GitHub repository. Each site also has a reference to the other, so as long as you view one, you can get to the other.  Thank you, and please let me know if you have any questions.</a:t>
+            </a:r>
+          </a:p>
+        </p:txBody>
+      </p:sp>
+      <p:sp>
+        <p:nvSpPr>
+          <p:cNvPr id="4" name="Slide Number Placeholder 3"/>
+          <p:cNvSpPr>
+            <a:spLocks noGrp="1"/>
+          </p:cNvSpPr>
+          <p:nvPr>
+            <p:ph type="sldNum" sz="quarter" idx="5"/>
+          </p:nvPr>
+        </p:nvSpPr>
+        <p:spPr/>
+        <p:txBody>
+          <a:bodyPr/>
+          <a:lstStyle/>
+          <a:p>
+            <a:fld id="{E627D67B-A2BE-8441-98D1-15A3A731A8EA}" type="slidenum">
+              <a:rPr lang="en-US" smtClean="0"/>
+              <a:t>14</a:t>
+            </a:fld>
+            <a:endParaRPr lang="en-US"/>
+          </a:p>
+        </p:txBody>
+      </p:sp>
+    </p:spTree>
+    <p:extLst>
+      <p:ext uri="{BB962C8B-B14F-4D97-AF65-F5344CB8AC3E}">
+        <p14:creationId xmlns:p14="http://schemas.microsoft.com/office/powerpoint/2010/main" val="1096282306"/>
+      </p:ext>
+    </p:extLst>
+  </p:cSld>
+  <p:clrMapOvr>
+    <a:masterClrMapping/>
+  </p:clrMapOvr>
+</p:notes>
+</file>
+
+<file path=ppt/notesSlides/notesSlide2.xml><?xml version="1.0" encoding="utf-8"?>
+<p:notes xmlns:a="http://schemas.openxmlformats.org/drawingml/2006/main" xmlns:r="http://schemas.openxmlformats.org/officeDocument/2006/relationships" xmlns:p="http://schemas.openxmlformats.org/presentationml/2006/main">
+  <p:cSld>
+    <p:spTree>
+      <p:nvGrpSpPr>
+        <p:cNvPr id="1" name=""/>
+        <p:cNvGrpSpPr/>
+        <p:nvPr/>
+      </p:nvGrpSpPr>
+      <p:grpSpPr>
+        <a:xfrm>
+          <a:off x="0" y="0"/>
+          <a:ext cx="0" cy="0"/>
+          <a:chOff x="0" y="0"/>
+          <a:chExt cx="0" cy="0"/>
+        </a:xfrm>
+      </p:grpSpPr>
+      <p:sp>
+        <p:nvSpPr>
+          <p:cNvPr id="2" name="Slide Image Placeholder 1"/>
+          <p:cNvSpPr>
+            <a:spLocks noGrp="1" noRot="1" noChangeAspect="1"/>
+          </p:cNvSpPr>
+          <p:nvPr>
+            <p:ph type="sldImg"/>
+          </p:nvPr>
+        </p:nvSpPr>
+        <p:spPr/>
+      </p:sp>
+      <p:sp>
+        <p:nvSpPr>
+          <p:cNvPr id="3" name="Notes Placeholder 2"/>
+          <p:cNvSpPr>
+            <a:spLocks noGrp="1"/>
+          </p:cNvSpPr>
+          <p:nvPr>
+            <p:ph type="body" idx="1"/>
+          </p:nvPr>
+        </p:nvSpPr>
+        <p:spPr/>
+        <p:txBody>
+          <a:bodyPr/>
+          <a:lstStyle/>
+          <a:p>
+            <a:r>
+              <a:rPr lang="en-US" dirty="0"/>
+              <a:t>In 2022, the Florida Department of Heath showed Unintentional accidents were the state’s 3</a:t>
+            </a:r>
+            <a:r>
+              <a:rPr lang="en-US" baseline="30000" dirty="0"/>
+              <a:t>rd</a:t>
+            </a:r>
+            <a:r>
+              <a:rPr lang="en-US" dirty="0"/>
+              <a:t> highest cause of death.  To improve public safety, international programs, such as Vision Zero, exist to help communities eliminate life-threatening events by implementing new roadway safety designs.  The University of Florida’s </a:t>
+            </a:r>
+            <a:r>
+              <a:rPr lang="en-US" dirty="0" err="1"/>
+              <a:t>GeoPlan</a:t>
+            </a:r>
+            <a:r>
+              <a:rPr lang="en-US" dirty="0"/>
+              <a:t> Center hosts and maintains a geospatial crash database called Signal Four Analytics which takes records from the Department of Highway Safety and Motor Vehicles and reporting officers. This raised the question of how well does machine learning predict these incapacitating events.</a:t>
+            </a:r>
+          </a:p>
+        </p:txBody>
+      </p:sp>
+      <p:sp>
+        <p:nvSpPr>
+          <p:cNvPr id="4" name="Slide Number Placeholder 3"/>
+          <p:cNvSpPr>
+            <a:spLocks noGrp="1"/>
+          </p:cNvSpPr>
+          <p:nvPr>
+            <p:ph type="sldNum" sz="quarter" idx="5"/>
+          </p:nvPr>
+        </p:nvSpPr>
+        <p:spPr/>
+        <p:txBody>
+          <a:bodyPr/>
+          <a:lstStyle/>
+          <a:p>
+            <a:fld id="{E627D67B-A2BE-8441-98D1-15A3A731A8EA}" type="slidenum">
+              <a:rPr lang="en-US" smtClean="0"/>
+              <a:t>2</a:t>
+            </a:fld>
+            <a:endParaRPr lang="en-US"/>
+          </a:p>
+        </p:txBody>
+      </p:sp>
+    </p:spTree>
+    <p:extLst>
+      <p:ext uri="{BB962C8B-B14F-4D97-AF65-F5344CB8AC3E}">
+        <p14:creationId xmlns:p14="http://schemas.microsoft.com/office/powerpoint/2010/main" val="1276450667"/>
+      </p:ext>
+    </p:extLst>
+  </p:cSld>
+  <p:clrMapOvr>
+    <a:masterClrMapping/>
+  </p:clrMapOvr>
+</p:notes>
+</file>
+
+<file path=ppt/notesSlides/notesSlide3.xml><?xml version="1.0" encoding="utf-8"?>
+<p:notes xmlns:a="http://schemas.openxmlformats.org/drawingml/2006/main" xmlns:r="http://schemas.openxmlformats.org/officeDocument/2006/relationships" xmlns:p="http://schemas.openxmlformats.org/presentationml/2006/main">
+  <p:cSld>
+    <p:spTree>
+      <p:nvGrpSpPr>
+        <p:cNvPr id="1" name=""/>
+        <p:cNvGrpSpPr/>
+        <p:nvPr/>
+      </p:nvGrpSpPr>
+      <p:grpSpPr>
+        <a:xfrm>
+          <a:off x="0" y="0"/>
+          <a:ext cx="0" cy="0"/>
+          <a:chOff x="0" y="0"/>
+          <a:chExt cx="0" cy="0"/>
+        </a:xfrm>
+      </p:grpSpPr>
+      <p:sp>
+        <p:nvSpPr>
+          <p:cNvPr id="2" name="Slide Image Placeholder 1"/>
+          <p:cNvSpPr>
+            <a:spLocks noGrp="1" noRot="1" noChangeAspect="1"/>
+          </p:cNvSpPr>
+          <p:nvPr>
+            <p:ph type="sldImg"/>
+          </p:nvPr>
+        </p:nvSpPr>
+        <p:spPr/>
+      </p:sp>
+      <p:sp>
+        <p:nvSpPr>
+          <p:cNvPr id="3" name="Notes Placeholder 2"/>
+          <p:cNvSpPr>
+            <a:spLocks noGrp="1"/>
+          </p:cNvSpPr>
+          <p:nvPr>
+            <p:ph type="body" idx="1"/>
+          </p:nvPr>
+        </p:nvSpPr>
+        <p:spPr/>
+        <p:txBody>
+          <a:bodyPr/>
+          <a:lstStyle/>
+          <a:p>
+            <a:r>
+              <a:rPr lang="en-US" dirty="0"/>
+              <a:t>The study area is Hillsborough County located on the coast of southwest Florida. The county has 3 incorporated cities: Tampa, Plant City, and Temple Terrace. In July of 2023, the population was 1.5M with an estimated growth to over 2M by 2050. As the regional density increases, more cars will be on the road which can lead to more accidents.</a:t>
+            </a:r>
+          </a:p>
+        </p:txBody>
+      </p:sp>
+      <p:sp>
+        <p:nvSpPr>
+          <p:cNvPr id="4" name="Slide Number Placeholder 3"/>
+          <p:cNvSpPr>
+            <a:spLocks noGrp="1"/>
+          </p:cNvSpPr>
+          <p:nvPr>
+            <p:ph type="sldNum" sz="quarter" idx="5"/>
+          </p:nvPr>
+        </p:nvSpPr>
+        <p:spPr/>
+        <p:txBody>
+          <a:bodyPr/>
+          <a:lstStyle/>
+          <a:p>
+            <a:fld id="{E627D67B-A2BE-8441-98D1-15A3A731A8EA}" type="slidenum">
+              <a:rPr lang="en-US" smtClean="0"/>
+              <a:t>3</a:t>
+            </a:fld>
+            <a:endParaRPr lang="en-US"/>
+          </a:p>
+        </p:txBody>
+      </p:sp>
+    </p:spTree>
+    <p:extLst>
+      <p:ext uri="{BB962C8B-B14F-4D97-AF65-F5344CB8AC3E}">
+        <p14:creationId xmlns:p14="http://schemas.microsoft.com/office/powerpoint/2010/main" val="3628797075"/>
+      </p:ext>
+    </p:extLst>
+  </p:cSld>
+  <p:clrMapOvr>
+    <a:masterClrMapping/>
+  </p:clrMapOvr>
+</p:notes>
+</file>
+
+<file path=ppt/notesSlides/notesSlide4.xml><?xml version="1.0" encoding="utf-8"?>
+<p:notes xmlns:a="http://schemas.openxmlformats.org/drawingml/2006/main" xmlns:r="http://schemas.openxmlformats.org/officeDocument/2006/relationships" xmlns:p="http://schemas.openxmlformats.org/presentationml/2006/main">
+  <p:cSld>
+    <p:spTree>
+      <p:nvGrpSpPr>
+        <p:cNvPr id="1" name=""/>
+        <p:cNvGrpSpPr/>
+        <p:nvPr/>
+      </p:nvGrpSpPr>
+      <p:grpSpPr>
+        <a:xfrm>
+          <a:off x="0" y="0"/>
+          <a:ext cx="0" cy="0"/>
+          <a:chOff x="0" y="0"/>
+          <a:chExt cx="0" cy="0"/>
+        </a:xfrm>
+      </p:grpSpPr>
+      <p:sp>
+        <p:nvSpPr>
+          <p:cNvPr id="2" name="Slide Image Placeholder 1"/>
+          <p:cNvSpPr>
+            <a:spLocks noGrp="1" noRot="1" noChangeAspect="1"/>
+          </p:cNvSpPr>
+          <p:nvPr>
+            <p:ph type="sldImg"/>
+          </p:nvPr>
+        </p:nvSpPr>
+        <p:spPr/>
+      </p:sp>
+      <p:sp>
+        <p:nvSpPr>
+          <p:cNvPr id="3" name="Notes Placeholder 2"/>
+          <p:cNvSpPr>
+            <a:spLocks noGrp="1"/>
+          </p:cNvSpPr>
+          <p:nvPr>
+            <p:ph type="body" idx="1"/>
+          </p:nvPr>
+        </p:nvSpPr>
+        <p:spPr/>
+        <p:txBody>
+          <a:bodyPr/>
+          <a:lstStyle/>
+          <a:p>
+            <a:r>
+              <a:rPr lang="en-US" dirty="0"/>
+              <a:t>For the analysis, all 2023 crash events were exported.  By default, Signal Four has 117 predictors consisting of a mix of categories, quantities, dates, spatial, and unstructured values. To simplify the the data for analysis, 23 columns  from Signal Four were selected with the addition of 2 generated columns for a total of 25 attributes. Crash Severity was classified into a binary repones with fatal or serious injuries represented as </a:t>
+            </a:r>
+            <a:r>
+              <a:rPr lang="en-US" sz="1200" kern="1200" dirty="0">
+                <a:solidFill>
+                  <a:schemeClr val="tx1"/>
+                </a:solidFill>
+                <a:latin typeface="+mn-lt"/>
+                <a:ea typeface="+mn-ea"/>
+                <a:cs typeface="+mn-cs"/>
+              </a:rPr>
+              <a:t>Incapacitating</a:t>
+            </a:r>
+            <a:r>
+              <a:rPr lang="en-US" dirty="0"/>
+              <a:t> and no injury and minor injuries as </a:t>
+            </a:r>
+            <a:r>
+              <a:rPr lang="en-US" sz="1200" kern="1200" dirty="0">
+                <a:solidFill>
+                  <a:schemeClr val="tx1"/>
+                </a:solidFill>
+                <a:latin typeface="+mn-lt"/>
+                <a:ea typeface="+mn-ea"/>
+                <a:cs typeface="+mn-cs"/>
+              </a:rPr>
+              <a:t>Non-Incapacitating</a:t>
+            </a:r>
+            <a:r>
+              <a:rPr lang="en-US" dirty="0"/>
+              <a:t>. The date and time of the events were transformed into 5 peak traffic period bins for AM, Mid, PM, Weekend, and Off peak. </a:t>
+            </a:r>
+          </a:p>
+        </p:txBody>
+      </p:sp>
+      <p:sp>
+        <p:nvSpPr>
+          <p:cNvPr id="4" name="Slide Number Placeholder 3"/>
+          <p:cNvSpPr>
+            <a:spLocks noGrp="1"/>
+          </p:cNvSpPr>
+          <p:nvPr>
+            <p:ph type="sldNum" sz="quarter" idx="5"/>
+          </p:nvPr>
+        </p:nvSpPr>
+        <p:spPr/>
+        <p:txBody>
+          <a:bodyPr/>
+          <a:lstStyle/>
+          <a:p>
+            <a:fld id="{E627D67B-A2BE-8441-98D1-15A3A731A8EA}" type="slidenum">
+              <a:rPr lang="en-US" smtClean="0"/>
+              <a:t>4</a:t>
+            </a:fld>
+            <a:endParaRPr lang="en-US"/>
+          </a:p>
+        </p:txBody>
+      </p:sp>
+    </p:spTree>
+    <p:extLst>
+      <p:ext uri="{BB962C8B-B14F-4D97-AF65-F5344CB8AC3E}">
+        <p14:creationId xmlns:p14="http://schemas.microsoft.com/office/powerpoint/2010/main" val="2609045230"/>
+      </p:ext>
+    </p:extLst>
+  </p:cSld>
+  <p:clrMapOvr>
+    <a:masterClrMapping/>
+  </p:clrMapOvr>
+</p:notes>
+</file>
+
+<file path=ppt/notesSlides/notesSlide5.xml><?xml version="1.0" encoding="utf-8"?>
+<p:notes xmlns:a="http://schemas.openxmlformats.org/drawingml/2006/main" xmlns:r="http://schemas.openxmlformats.org/officeDocument/2006/relationships" xmlns:p="http://schemas.openxmlformats.org/presentationml/2006/main">
+  <p:cSld>
+    <p:spTree>
+      <p:nvGrpSpPr>
+        <p:cNvPr id="1" name=""/>
+        <p:cNvGrpSpPr/>
+        <p:nvPr/>
+      </p:nvGrpSpPr>
+      <p:grpSpPr>
+        <a:xfrm>
+          <a:off x="0" y="0"/>
+          <a:ext cx="0" cy="0"/>
+          <a:chOff x="0" y="0"/>
+          <a:chExt cx="0" cy="0"/>
+        </a:xfrm>
+      </p:grpSpPr>
+      <p:sp>
+        <p:nvSpPr>
+          <p:cNvPr id="2" name="Slide Image Placeholder 1"/>
+          <p:cNvSpPr>
+            <a:spLocks noGrp="1" noRot="1" noChangeAspect="1"/>
+          </p:cNvSpPr>
+          <p:nvPr>
+            <p:ph type="sldImg"/>
+          </p:nvPr>
+        </p:nvSpPr>
+        <p:spPr/>
+      </p:sp>
+      <p:sp>
+        <p:nvSpPr>
+          <p:cNvPr id="3" name="Notes Placeholder 2"/>
+          <p:cNvSpPr>
+            <a:spLocks noGrp="1"/>
+          </p:cNvSpPr>
+          <p:nvPr>
+            <p:ph type="body" idx="1"/>
+          </p:nvPr>
+        </p:nvSpPr>
+        <p:spPr/>
+        <p:txBody>
+          <a:bodyPr/>
+          <a:lstStyle/>
+          <a:p>
+            <a:r>
+              <a:rPr lang="en-US" dirty="0"/>
+              <a:t>Above are the columns used for this analysis along with their descriptions taken from the data dictionary. The top row, Incapacitating flag, represents the response variable used for training and prediction.</a:t>
+            </a:r>
+          </a:p>
+        </p:txBody>
+      </p:sp>
+      <p:sp>
+        <p:nvSpPr>
+          <p:cNvPr id="4" name="Slide Number Placeholder 3"/>
+          <p:cNvSpPr>
+            <a:spLocks noGrp="1"/>
+          </p:cNvSpPr>
+          <p:nvPr>
+            <p:ph type="sldNum" sz="quarter" idx="5"/>
+          </p:nvPr>
+        </p:nvSpPr>
+        <p:spPr/>
+        <p:txBody>
+          <a:bodyPr/>
+          <a:lstStyle/>
+          <a:p>
+            <a:fld id="{E627D67B-A2BE-8441-98D1-15A3A731A8EA}" type="slidenum">
+              <a:rPr lang="en-US" smtClean="0"/>
+              <a:t>5</a:t>
+            </a:fld>
+            <a:endParaRPr lang="en-US"/>
+          </a:p>
+        </p:txBody>
+      </p:sp>
+    </p:spTree>
+    <p:extLst>
+      <p:ext uri="{BB962C8B-B14F-4D97-AF65-F5344CB8AC3E}">
+        <p14:creationId xmlns:p14="http://schemas.microsoft.com/office/powerpoint/2010/main" val="1650770639"/>
+      </p:ext>
+    </p:extLst>
+  </p:cSld>
+  <p:clrMapOvr>
+    <a:masterClrMapping/>
+  </p:clrMapOvr>
+</p:notes>
+</file>
+
+<file path=ppt/notesSlides/notesSlide6.xml><?xml version="1.0" encoding="utf-8"?>
+<p:notes xmlns:a="http://schemas.openxmlformats.org/drawingml/2006/main" xmlns:r="http://schemas.openxmlformats.org/officeDocument/2006/relationships" xmlns:p="http://schemas.openxmlformats.org/presentationml/2006/main">
+  <p:cSld>
+    <p:spTree>
+      <p:nvGrpSpPr>
+        <p:cNvPr id="1" name=""/>
+        <p:cNvGrpSpPr/>
+        <p:nvPr/>
+      </p:nvGrpSpPr>
+      <p:grpSpPr>
+        <a:xfrm>
+          <a:off x="0" y="0"/>
+          <a:ext cx="0" cy="0"/>
+          <a:chOff x="0" y="0"/>
+          <a:chExt cx="0" cy="0"/>
+        </a:xfrm>
+      </p:grpSpPr>
+      <p:sp>
+        <p:nvSpPr>
+          <p:cNvPr id="2" name="Slide Image Placeholder 1"/>
+          <p:cNvSpPr>
+            <a:spLocks noGrp="1" noRot="1" noChangeAspect="1"/>
+          </p:cNvSpPr>
+          <p:nvPr>
+            <p:ph type="sldImg"/>
+          </p:nvPr>
+        </p:nvSpPr>
+        <p:spPr/>
+      </p:sp>
+      <p:sp>
+        <p:nvSpPr>
+          <p:cNvPr id="3" name="Notes Placeholder 2"/>
+          <p:cNvSpPr>
+            <a:spLocks noGrp="1"/>
+          </p:cNvSpPr>
+          <p:nvPr>
+            <p:ph type="body" idx="1"/>
+          </p:nvPr>
+        </p:nvSpPr>
+        <p:spPr/>
+        <p:txBody>
+          <a:bodyPr/>
+          <a:lstStyle/>
+          <a:p>
+            <a:r>
+              <a:rPr lang="en-US" dirty="0"/>
+              <a:t>The crash locations in the raw data are shown on this slide. The bin aggregate map, shows that the majority of the crashes occur within city limits with linear tangents along the highways heading east towards Orlando and north towards Gainesville.  A significant portion of all crashes occurred on local roadways with almost 3x more events than the next leading roadway system. This trend stays relatively true when considering only incapacitating events with the proportion dropping closer to 2x more than the next leading system. What this means is traffic safety improvements are especially important within the City.</a:t>
+            </a:r>
+          </a:p>
+        </p:txBody>
+      </p:sp>
+      <p:sp>
+        <p:nvSpPr>
+          <p:cNvPr id="4" name="Slide Number Placeholder 3"/>
+          <p:cNvSpPr>
+            <a:spLocks noGrp="1"/>
+          </p:cNvSpPr>
+          <p:nvPr>
+            <p:ph type="sldNum" sz="quarter" idx="5"/>
+          </p:nvPr>
+        </p:nvSpPr>
+        <p:spPr/>
+        <p:txBody>
+          <a:bodyPr/>
+          <a:lstStyle/>
+          <a:p>
+            <a:fld id="{E627D67B-A2BE-8441-98D1-15A3A731A8EA}" type="slidenum">
+              <a:rPr lang="en-US" smtClean="0"/>
+              <a:t>6</a:t>
+            </a:fld>
+            <a:endParaRPr lang="en-US"/>
+          </a:p>
+        </p:txBody>
+      </p:sp>
+    </p:spTree>
+    <p:extLst>
+      <p:ext uri="{BB962C8B-B14F-4D97-AF65-F5344CB8AC3E}">
+        <p14:creationId xmlns:p14="http://schemas.microsoft.com/office/powerpoint/2010/main" val="2831714685"/>
+      </p:ext>
+    </p:extLst>
+  </p:cSld>
+  <p:clrMapOvr>
+    <a:masterClrMapping/>
+  </p:clrMapOvr>
+</p:notes>
+</file>
+
+<file path=ppt/notesSlides/notesSlide7.xml><?xml version="1.0" encoding="utf-8"?>
+<p:notes xmlns:a="http://schemas.openxmlformats.org/drawingml/2006/main" xmlns:r="http://schemas.openxmlformats.org/officeDocument/2006/relationships" xmlns:p="http://schemas.openxmlformats.org/presentationml/2006/main">
+  <p:cSld>
+    <p:spTree>
+      <p:nvGrpSpPr>
+        <p:cNvPr id="1" name=""/>
+        <p:cNvGrpSpPr/>
+        <p:nvPr/>
+      </p:nvGrpSpPr>
+      <p:grpSpPr>
+        <a:xfrm>
+          <a:off x="0" y="0"/>
+          <a:ext cx="0" cy="0"/>
+          <a:chOff x="0" y="0"/>
+          <a:chExt cx="0" cy="0"/>
+        </a:xfrm>
+      </p:grpSpPr>
+      <p:sp>
+        <p:nvSpPr>
+          <p:cNvPr id="2" name="Slide Image Placeholder 1"/>
+          <p:cNvSpPr>
+            <a:spLocks noGrp="1" noRot="1" noChangeAspect="1"/>
+          </p:cNvSpPr>
+          <p:nvPr>
+            <p:ph type="sldImg"/>
+          </p:nvPr>
+        </p:nvSpPr>
+        <p:spPr/>
+      </p:sp>
+      <p:sp>
+        <p:nvSpPr>
+          <p:cNvPr id="3" name="Notes Placeholder 2"/>
+          <p:cNvSpPr>
+            <a:spLocks noGrp="1"/>
+          </p:cNvSpPr>
+          <p:nvPr>
+            <p:ph type="body" idx="1"/>
+          </p:nvPr>
+        </p:nvSpPr>
+        <p:spPr/>
+        <p:txBody>
+          <a:bodyPr/>
+          <a:lstStyle/>
+          <a:p>
+            <a:r>
+              <a:rPr lang="en-US" dirty="0"/>
+              <a:t>For crash types for all events, accidents involving rear ends were the most common, but a slightly different trend shows when considering only incapacitating events. Taking a left turn over on-coming traffic was the leading crash type, and pedestrians being on the roadside, rear ends, and drivers running off the road were the other leading causes of incapacitating events. As far as peak traffic hours go, the mid-day rush between 10a-4p has the most events and the off peak between M-F 7p-7a and Sa-</a:t>
+            </a:r>
+            <a:r>
+              <a:rPr lang="en-US" dirty="0" err="1"/>
+              <a:t>Su</a:t>
+            </a:r>
+            <a:r>
+              <a:rPr lang="en-US" dirty="0"/>
+              <a:t> 8p-6a has the most incapacitating events, which could be related to lack of visibility or alcohol.</a:t>
+            </a:r>
+          </a:p>
+        </p:txBody>
+      </p:sp>
+      <p:sp>
+        <p:nvSpPr>
+          <p:cNvPr id="4" name="Slide Number Placeholder 3"/>
+          <p:cNvSpPr>
+            <a:spLocks noGrp="1"/>
+          </p:cNvSpPr>
+          <p:nvPr>
+            <p:ph type="sldNum" sz="quarter" idx="5"/>
+          </p:nvPr>
+        </p:nvSpPr>
+        <p:spPr/>
+        <p:txBody>
+          <a:bodyPr/>
+          <a:lstStyle/>
+          <a:p>
+            <a:fld id="{E627D67B-A2BE-8441-98D1-15A3A731A8EA}" type="slidenum">
+              <a:rPr lang="en-US" smtClean="0"/>
+              <a:t>7</a:t>
+            </a:fld>
+            <a:endParaRPr lang="en-US"/>
+          </a:p>
+        </p:txBody>
+      </p:sp>
+    </p:spTree>
+    <p:extLst>
+      <p:ext uri="{BB962C8B-B14F-4D97-AF65-F5344CB8AC3E}">
+        <p14:creationId xmlns:p14="http://schemas.microsoft.com/office/powerpoint/2010/main" val="3307696723"/>
+      </p:ext>
+    </p:extLst>
+  </p:cSld>
+  <p:clrMapOvr>
+    <a:masterClrMapping/>
+  </p:clrMapOvr>
+</p:notes>
+</file>
+
+<file path=ppt/notesSlides/notesSlide8.xml><?xml version="1.0" encoding="utf-8"?>
+<p:notes xmlns:a="http://schemas.openxmlformats.org/drawingml/2006/main" xmlns:r="http://schemas.openxmlformats.org/officeDocument/2006/relationships" xmlns:p="http://schemas.openxmlformats.org/presentationml/2006/main">
+  <p:cSld>
+    <p:spTree>
+      <p:nvGrpSpPr>
+        <p:cNvPr id="1" name=""/>
+        <p:cNvGrpSpPr/>
+        <p:nvPr/>
+      </p:nvGrpSpPr>
+      <p:grpSpPr>
+        <a:xfrm>
+          <a:off x="0" y="0"/>
+          <a:ext cx="0" cy="0"/>
+          <a:chOff x="0" y="0"/>
+          <a:chExt cx="0" cy="0"/>
+        </a:xfrm>
+      </p:grpSpPr>
+      <p:sp>
+        <p:nvSpPr>
+          <p:cNvPr id="2" name="Slide Image Placeholder 1"/>
+          <p:cNvSpPr>
+            <a:spLocks noGrp="1" noRot="1" noChangeAspect="1"/>
+          </p:cNvSpPr>
+          <p:nvPr>
+            <p:ph type="sldImg"/>
+          </p:nvPr>
+        </p:nvSpPr>
+        <p:spPr/>
+      </p:sp>
+      <p:sp>
+        <p:nvSpPr>
+          <p:cNvPr id="3" name="Notes Placeholder 2"/>
+          <p:cNvSpPr>
+            <a:spLocks noGrp="1"/>
+          </p:cNvSpPr>
+          <p:nvPr>
+            <p:ph type="body" idx="1"/>
+          </p:nvPr>
+        </p:nvSpPr>
+        <p:spPr/>
+        <p:txBody>
+          <a:bodyPr/>
+          <a:lstStyle/>
+          <a:p>
+            <a:r>
+              <a:rPr lang="en-US" dirty="0"/>
+              <a:t>To get started, a subset of the data was reserved for testing while the majority was used for training.  The severity of crash data is unbalanced with about 2.5% classified as incapacitating.  While this adds a challenge when training a model to successfully make predictions, this is a good problem to have. When I am on the road, I want the odds of my safety strongly skewed in my favor of not experiencing a life-threatening event. Techniques to account for this include under-sampling the majority class, over-sampling the minority class, or synthetically sampling both classes using either ROSE or SMOTE.  The  code shown here is an example using ROSE to ensure the size of each class is 2,000. 3 different models were trained and the testing error and specificity were compared to measure performance.</a:t>
+            </a:r>
+          </a:p>
+        </p:txBody>
+      </p:sp>
+      <p:sp>
+        <p:nvSpPr>
+          <p:cNvPr id="4" name="Slide Number Placeholder 3"/>
+          <p:cNvSpPr>
+            <a:spLocks noGrp="1"/>
+          </p:cNvSpPr>
+          <p:nvPr>
+            <p:ph type="sldNum" sz="quarter" idx="5"/>
+          </p:nvPr>
+        </p:nvSpPr>
+        <p:spPr/>
+        <p:txBody>
+          <a:bodyPr/>
+          <a:lstStyle/>
+          <a:p>
+            <a:fld id="{E627D67B-A2BE-8441-98D1-15A3A731A8EA}" type="slidenum">
+              <a:rPr lang="en-US" smtClean="0"/>
+              <a:t>8</a:t>
+            </a:fld>
+            <a:endParaRPr lang="en-US"/>
+          </a:p>
+        </p:txBody>
+      </p:sp>
+    </p:spTree>
+    <p:extLst>
+      <p:ext uri="{BB962C8B-B14F-4D97-AF65-F5344CB8AC3E}">
+        <p14:creationId xmlns:p14="http://schemas.microsoft.com/office/powerpoint/2010/main" val="3569972429"/>
+      </p:ext>
+    </p:extLst>
+  </p:cSld>
+  <p:clrMapOvr>
+    <a:masterClrMapping/>
+  </p:clrMapOvr>
+</p:notes>
+</file>
+
+<file path=ppt/notesSlides/notesSlide9.xml><?xml version="1.0" encoding="utf-8"?>
+<p:notes xmlns:a="http://schemas.openxmlformats.org/drawingml/2006/main" xmlns:r="http://schemas.openxmlformats.org/officeDocument/2006/relationships" xmlns:p="http://schemas.openxmlformats.org/presentationml/2006/main">
+  <p:cSld>
+    <p:spTree>
+      <p:nvGrpSpPr>
+        <p:cNvPr id="1" name=""/>
+        <p:cNvGrpSpPr/>
+        <p:nvPr/>
+      </p:nvGrpSpPr>
+      <p:grpSpPr>
+        <a:xfrm>
+          <a:off x="0" y="0"/>
+          <a:ext cx="0" cy="0"/>
+          <a:chOff x="0" y="0"/>
+          <a:chExt cx="0" cy="0"/>
+        </a:xfrm>
+      </p:grpSpPr>
+      <p:sp>
+        <p:nvSpPr>
+          <p:cNvPr id="2" name="Slide Image Placeholder 1"/>
+          <p:cNvSpPr>
+            <a:spLocks noGrp="1" noRot="1" noChangeAspect="1"/>
+          </p:cNvSpPr>
+          <p:nvPr>
+            <p:ph type="sldImg"/>
+          </p:nvPr>
+        </p:nvSpPr>
+        <p:spPr/>
+      </p:sp>
+      <p:sp>
+        <p:nvSpPr>
+          <p:cNvPr id="3" name="Notes Placeholder 2"/>
+          <p:cNvSpPr>
+            <a:spLocks noGrp="1"/>
+          </p:cNvSpPr>
+          <p:nvPr>
+            <p:ph type="body" idx="1"/>
+          </p:nvPr>
+        </p:nvSpPr>
+        <p:spPr/>
+        <p:txBody>
+          <a:bodyPr/>
+          <a:lstStyle/>
+          <a:p>
+            <a:r>
+              <a:rPr lang="en-US" dirty="0"/>
+              <a:t>Logistic regression is a binary classification model, which is suitable when you want to understand the probability of an event occurring. Variable selection can simplify the model by only using variables that contribute to the model’s performance by comparing the AIC values between each iteration. This can be done taking a forward approach and adding variables, a backward approach and removing variables, or a stepwise approach that is a combination of both forward and backwards. One method is the stepwise approach which both adds and removes variables from the model using the step() function in R. This results in 16 variables shown in the table on the bottom of this slide.</a:t>
+            </a:r>
           </a:p>
         </p:txBody>
       </p:sp>
@@ -4960,7 +6357,7 @@
           <a:p>
             <a:pPr algn="l"/>
             <a:r>
-              <a:rPr lang="en-US" sz="4800">
+              <a:rPr lang="en-US" sz="4800" dirty="0">
                 <a:solidFill>
                   <a:srgbClr val="FFFFFF"/>
                 </a:solidFill>
@@ -4970,7 +6367,7 @@
               <a:t>Predictive Analysis of Crash</a:t>
             </a:r>
             <a:br>
-              <a:rPr lang="en-US" sz="4800">
+              <a:rPr lang="en-US" sz="4800" dirty="0">
                 <a:solidFill>
                   <a:srgbClr val="FFFFFF"/>
                 </a:solidFill>
@@ -4979,7 +6376,7 @@
               </a:rPr>
             </a:br>
             <a:r>
-              <a:rPr lang="en-US" sz="4800">
+              <a:rPr lang="en-US" sz="4800" dirty="0">
                 <a:solidFill>
                   <a:srgbClr val="FFFFFF"/>
                 </a:solidFill>
@@ -4989,7 +6386,7 @@
               <a:t>Incidents in Hillsborough</a:t>
             </a:r>
             <a:br>
-              <a:rPr lang="en-US" sz="4800">
+              <a:rPr lang="en-US" sz="4800" dirty="0">
                 <a:solidFill>
                   <a:srgbClr val="FFFFFF"/>
                 </a:solidFill>
@@ -4998,7 +6395,7 @@
               </a:rPr>
             </a:br>
             <a:r>
-              <a:rPr lang="en-US" sz="4800">
+              <a:rPr lang="en-US" sz="4800" dirty="0">
                 <a:solidFill>
                   <a:srgbClr val="FFFFFF"/>
                 </a:solidFill>
@@ -5007,7 +6404,7 @@
               </a:rPr>
               <a:t>County</a:t>
             </a:r>
-            <a:endParaRPr lang="en-US" sz="4800">
+            <a:endParaRPr lang="en-US" sz="4800" dirty="0">
               <a:solidFill>
                 <a:srgbClr val="FFFFFF"/>
               </a:solidFill>
@@ -5045,21 +6442,21 @@
           <a:p>
             <a:pPr algn="l"/>
             <a:r>
-              <a:rPr lang="en-US"/>
+              <a:rPr lang="en-US" b="1" dirty="0"/>
               <a:t>Bo Fethe</a:t>
             </a:r>
           </a:p>
           <a:p>
             <a:pPr algn="l"/>
             <a:r>
-              <a:rPr lang="en-US"/>
+              <a:rPr lang="en-US" sz="1600" dirty="0"/>
               <a:t>Group 123</a:t>
             </a:r>
           </a:p>
           <a:p>
             <a:pPr algn="l"/>
             <a:r>
-              <a:rPr lang="en-US"/>
+              <a:rPr lang="en-US" sz="1600" dirty="0"/>
               <a:t>March 2024</a:t>
             </a:r>
           </a:p>
@@ -5273,7 +6670,7 @@
           <p:nvPr/>
         </p:nvPicPr>
         <p:blipFill rotWithShape="1">
-          <a:blip r:embed="rId2"/>
+          <a:blip r:embed="rId3"/>
           <a:srcRect r="55303"/>
           <a:stretch/>
         </p:blipFill>
@@ -5424,14 +6821,14 @@
             <a:pPr lvl="1"/>
             <a:r>
               <a:rPr lang="en-US" dirty="0"/>
+              <a:t>Use cross-validation to find the optimal # of iterations</a:t>
+            </a:r>
+          </a:p>
+          <a:p>
+            <a:pPr lvl="1"/>
+            <a:r>
+              <a:rPr lang="en-US" dirty="0"/>
               <a:t>Suitable when you can tolerate longer training times</a:t>
-            </a:r>
-          </a:p>
-          <a:p>
-            <a:pPr lvl="1"/>
-            <a:r>
-              <a:rPr lang="en-US" dirty="0"/>
-              <a:t>Use cross-validation to find the optimal # of iterations</a:t>
             </a:r>
           </a:p>
           <a:p>
@@ -5502,7 +6899,7 @@
           <p:nvPr/>
         </p:nvPicPr>
         <p:blipFill rotWithShape="1">
-          <a:blip r:embed="rId2"/>
+          <a:blip r:embed="rId3"/>
           <a:srcRect l="54714" t="-256" r="589" b="256"/>
           <a:stretch/>
         </p:blipFill>
@@ -8525,8 +9922,37 @@
         </p:nvSpPr>
         <p:spPr/>
         <p:txBody>
-          <a:bodyPr/>
+          <a:bodyPr>
+            <a:normAutofit/>
+          </a:bodyPr>
           <a:lstStyle/>
+          <a:p>
+            <a:r>
+              <a:rPr lang="en-US" b="1" dirty="0"/>
+              <a:t>Q: How well can machine learning predict incapacitating events?</a:t>
+            </a:r>
+          </a:p>
+          <a:p>
+            <a:pPr lvl="1"/>
+            <a:r>
+              <a:rPr lang="en-US" dirty="0"/>
+              <a:t>Different interpretations</a:t>
+            </a:r>
+          </a:p>
+          <a:p>
+            <a:pPr lvl="2"/>
+            <a:r>
+              <a:rPr lang="en-US" dirty="0"/>
+              <a:t>Best for overall accuracy: Generalized Boosting Regression</a:t>
+            </a:r>
+          </a:p>
+          <a:p>
+            <a:pPr lvl="2"/>
+            <a:r>
+              <a:rPr lang="en-US" dirty="0"/>
+              <a:t>Best for predicting incapacitating events: Logistic Regression</a:t>
+            </a:r>
+          </a:p>
           <a:p>
             <a:r>
               <a:rPr lang="en-US" dirty="0"/>
@@ -8544,32 +9970,12 @@
             <a:pPr lvl="1"/>
             <a:r>
               <a:rPr lang="en-US" dirty="0"/>
-              <a:t>Truthful reported values</a:t>
+              <a:t>Missing/wrong data</a:t>
             </a:r>
           </a:p>
           <a:p>
             <a:pPr lvl="1"/>
             <a:endParaRPr lang="en-US" dirty="0"/>
-          </a:p>
-          <a:p>
-            <a:r>
-              <a:rPr lang="en-US" dirty="0"/>
-              <a:t>Different interpretations</a:t>
-            </a:r>
-          </a:p>
-          <a:p>
-            <a:pPr lvl="1"/>
-            <a:r>
-              <a:rPr lang="en-US" dirty="0"/>
-              <a:t>Best for overall accuracy: Generalized Boosting Regression</a:t>
-            </a:r>
-          </a:p>
-          <a:p>
-            <a:pPr lvl="1"/>
-            <a:r>
-              <a:rPr lang="en-US" dirty="0"/>
-              <a:t>Best for predicting incapacitating events: Logistic Regression</a:t>
-            </a:r>
           </a:p>
           <a:p>
             <a:endParaRPr lang="en-US" dirty="0"/>
@@ -8672,7 +10078,7 @@
       <p:pic>
         <p:nvPicPr>
           <p:cNvPr id="5" name="Content Placeholder 4" descr="A qr code with a blue hexagon&#10;&#10;Description automatically generated">
-            <a:hlinkClick r:id="rId2"/>
+            <a:hlinkClick r:id="rId3"/>
             <a:extLst>
               <a:ext uri="{FF2B5EF4-FFF2-40B4-BE49-F238E27FC236}">
                 <a16:creationId xmlns:a16="http://schemas.microsoft.com/office/drawing/2014/main" id="{2D671726-5D13-2397-A4EE-1500DCF9A3A6}"/>
@@ -8687,15 +10093,15 @@
           </p:nvPr>
         </p:nvPicPr>
         <p:blipFill>
-          <a:blip r:embed="rId3"/>
+          <a:blip r:embed="rId4"/>
           <a:stretch>
             <a:fillRect/>
           </a:stretch>
         </p:blipFill>
         <p:spPr>
           <a:xfrm>
-            <a:off x="1368932" y="1603216"/>
-            <a:ext cx="4351338" cy="4351338"/>
+            <a:off x="1734004" y="1655768"/>
+            <a:ext cx="3546463" cy="3546463"/>
           </a:xfrm>
           <a:ln>
             <a:noFill/>
@@ -8705,7 +10111,7 @@
       <p:pic>
         <p:nvPicPr>
           <p:cNvPr id="6" name="Content Placeholder 4">
-            <a:hlinkClick r:id="rId4"/>
+            <a:hlinkClick r:id="rId5"/>
             <a:extLst>
               <a:ext uri="{FF2B5EF4-FFF2-40B4-BE49-F238E27FC236}">
                 <a16:creationId xmlns:a16="http://schemas.microsoft.com/office/drawing/2014/main" id="{C239DB4B-D413-B49E-86C4-1E0568279CB7}"/>
@@ -8718,14 +10124,14 @@
           <p:nvPr/>
         </p:nvPicPr>
         <p:blipFill>
-          <a:blip r:embed="rId5"/>
+          <a:blip r:embed="rId6"/>
           <a:srcRect/>
           <a:stretch/>
         </p:blipFill>
         <p:spPr>
           <a:xfrm>
-            <a:off x="6530262" y="1603216"/>
-            <a:ext cx="4351338" cy="4351338"/>
+            <a:off x="6895110" y="1655768"/>
+            <a:ext cx="3545481" cy="3545481"/>
           </a:xfrm>
           <a:prstGeom prst="rect">
             <a:avLst/>
@@ -8749,8 +10155,8 @@
         </p:nvSpPr>
         <p:spPr>
           <a:xfrm>
-            <a:off x="1368932" y="5986392"/>
-            <a:ext cx="4351337" cy="646331"/>
+            <a:off x="1734987" y="5201249"/>
+            <a:ext cx="3545480" cy="646331"/>
           </a:xfrm>
           <a:prstGeom prst="rect">
             <a:avLst/>
@@ -8765,9 +10171,12 @@
           <a:p>
             <a:pPr algn="ctr"/>
             <a:r>
-              <a:rPr lang="en-US" dirty="0"/>
+              <a:rPr lang="en-US" dirty="0">
+                <a:hlinkClick r:id="rId3"/>
+              </a:rPr>
               <a:t>Explore the data using an interactive map on ArcGIS Online</a:t>
             </a:r>
+            <a:endParaRPr lang="en-US" dirty="0"/>
           </a:p>
         </p:txBody>
       </p:sp>
@@ -8785,8 +10194,8 @@
         </p:nvSpPr>
         <p:spPr>
           <a:xfrm>
-            <a:off x="6530261" y="5954554"/>
-            <a:ext cx="4351337" cy="369332"/>
+            <a:off x="6911535" y="5201248"/>
+            <a:ext cx="3545480" cy="646331"/>
           </a:xfrm>
           <a:prstGeom prst="rect">
             <a:avLst/>
@@ -8801,9 +10210,12 @@
           <a:p>
             <a:pPr algn="ctr"/>
             <a:r>
-              <a:rPr lang="en-US" dirty="0"/>
+              <a:rPr lang="en-US" dirty="0">
+                <a:hlinkClick r:id="rId5"/>
+              </a:rPr>
               <a:t>View the code and data used on GitHub</a:t>
             </a:r>
+            <a:endParaRPr lang="en-US" dirty="0"/>
           </a:p>
         </p:txBody>
       </p:sp>
@@ -8854,65 +10266,36 @@
           </a:p>
         </p:txBody>
       </p:sp>
-    </p:spTree>
-    <p:extLst>
-      <p:ext uri="{BB962C8B-B14F-4D97-AF65-F5344CB8AC3E}">
-        <p14:creationId xmlns:p14="http://schemas.microsoft.com/office/powerpoint/2010/main" val="1142648994"/>
-      </p:ext>
-    </p:extLst>
-  </p:cSld>
-  <p:clrMapOvr>
-    <a:masterClrMapping/>
-  </p:clrMapOvr>
-</p:sld>
-</file>
-
-<file path=ppt/slides/slide15.xml><?xml version="1.0" encoding="utf-8"?>
-<p:sld xmlns:a="http://schemas.openxmlformats.org/drawingml/2006/main" xmlns:r="http://schemas.openxmlformats.org/officeDocument/2006/relationships" xmlns:p="http://schemas.openxmlformats.org/presentationml/2006/main">
-  <p:cSld>
-    <p:spTree>
-      <p:nvGrpSpPr>
-        <p:cNvPr id="1" name=""/>
-        <p:cNvGrpSpPr/>
-        <p:nvPr/>
-      </p:nvGrpSpPr>
-      <p:grpSpPr>
-        <a:xfrm>
-          <a:off x="0" y="0"/>
-          <a:ext cx="0" cy="0"/>
-          <a:chOff x="0" y="0"/>
-          <a:chExt cx="0" cy="0"/>
-        </a:xfrm>
-      </p:grpSpPr>
       <p:sp>
         <p:nvSpPr>
-          <p:cNvPr id="2" name="Title 1">
+          <p:cNvPr id="3" name="TextBox 2">
             <a:extLst>
               <a:ext uri="{FF2B5EF4-FFF2-40B4-BE49-F238E27FC236}">
-                <a16:creationId xmlns:a16="http://schemas.microsoft.com/office/drawing/2014/main" id="{4ABB5996-2E4B-E6FE-D04D-26FA4EEBECA7}"/>
+                <a16:creationId xmlns:a16="http://schemas.microsoft.com/office/drawing/2014/main" id="{074A7335-6A0C-68E5-E000-323A37A81ED9}"/>
               </a:ext>
             </a:extLst>
           </p:cNvPr>
-          <p:cNvSpPr>
-            <a:spLocks noGrp="1"/>
-          </p:cNvSpPr>
-          <p:nvPr>
-            <p:ph type="title"/>
-          </p:nvPr>
+          <p:cNvSpPr txBox="1"/>
+          <p:nvPr/>
         </p:nvSpPr>
         <p:spPr>
           <a:xfrm>
-            <a:off x="838200" y="365125"/>
-            <a:ext cx="10515600" cy="6091431"/>
+            <a:off x="4810359" y="5916994"/>
+            <a:ext cx="2571281" cy="646331"/>
           </a:xfrm>
+          <a:prstGeom prst="rect">
+            <a:avLst/>
+          </a:prstGeom>
+          <a:noFill/>
         </p:spPr>
         <p:txBody>
-          <a:bodyPr/>
+          <a:bodyPr wrap="none" rtlCol="0">
+            <a:spAutoFit/>
+          </a:bodyPr>
           <a:lstStyle/>
           <a:p>
-            <a:pPr algn="ctr"/>
-            <a:r>
-              <a:rPr lang="en-US" dirty="0"/>
+            <a:r>
+              <a:rPr lang="en-US" sz="3600" b="1" dirty="0"/>
               <a:t>Questions?</a:t>
             </a:r>
           </a:p>
@@ -8921,7 +10304,7 @@
     </p:spTree>
     <p:extLst>
       <p:ext uri="{BB962C8B-B14F-4D97-AF65-F5344CB8AC3E}">
-        <p14:creationId xmlns:p14="http://schemas.microsoft.com/office/powerpoint/2010/main" val="571288211"/>
+        <p14:creationId xmlns:p14="http://schemas.microsoft.com/office/powerpoint/2010/main" val="1142648994"/>
       </p:ext>
     </p:extLst>
   </p:cSld>
@@ -9048,7 +10431,7 @@
           <a:p>
             <a:r>
               <a:rPr lang="en-US" dirty="0"/>
-              <a:t>Federal programs, like Vision Zero, help communities eliminate traffic fatalities and serious injuries by improving safety measures.</a:t>
+              <a:t>International programs, like Vision Zero, help communities eliminate traffic fatalities and serious injuries by improving safety measures.</a:t>
             </a:r>
           </a:p>
           <a:p>
@@ -9099,7 +10482,7 @@
             </a:r>
             <a:r>
               <a:rPr lang="en-US" sz="1000" dirty="0">
-                <a:hlinkClick r:id="rId2"/>
+                <a:hlinkClick r:id="rId3"/>
               </a:rPr>
               <a:t>https://www.flhealthcharts.gov/ChartsReports/rdPage.aspx?rdReport=ChartsProfiles.LeadingCausesOfDeathProfile</a:t>
             </a:r>
@@ -9327,7 +10710,7 @@
           <p:nvPr/>
         </p:nvPicPr>
         <p:blipFill>
-          <a:blip r:embed="rId2"/>
+          <a:blip r:embed="rId3"/>
           <a:stretch>
             <a:fillRect/>
           </a:stretch>
@@ -9383,7 +10766,7 @@
             </a:r>
             <a:r>
               <a:rPr lang="en-US" sz="1000" dirty="0">
-                <a:hlinkClick r:id="rId3"/>
+                <a:hlinkClick r:id="rId4"/>
               </a:rPr>
               <a:t>https://www.census.gov/quickfacts/fact/table/hillsboroughcountyflorida/PST045223</a:t>
             </a:r>
@@ -9400,7 +10783,7 @@
             </a:r>
             <a:r>
               <a:rPr lang="en-US" sz="1000" dirty="0">
-                <a:hlinkClick r:id="rId4"/>
+                <a:hlinkClick r:id="rId5"/>
               </a:rPr>
               <a:t>https://planhillsborough.org/county-to-reach-2-million-residents-and-1-4-million-jobs-by-2050</a:t>
             </a:r>
@@ -9541,7 +10924,7 @@
             </a:r>
             <a:r>
               <a:rPr lang="en-US" b="1" dirty="0"/>
-              <a:t>25 predictors</a:t>
+              <a:t>25 columns</a:t>
             </a:r>
           </a:p>
           <a:p>
@@ -9598,28 +10981,36 @@
             <a:pPr lvl="1"/>
             <a:r>
               <a:rPr lang="en-US" dirty="0"/>
-              <a:t>AM Peak (07:00-10:00)</a:t>
+              <a:t>AM Peak (M-F; 07:00-10:00)</a:t>
             </a:r>
           </a:p>
           <a:p>
             <a:pPr lvl="1"/>
             <a:r>
               <a:rPr lang="en-US" dirty="0"/>
-              <a:t>Mid Peak (10:00-16:00)</a:t>
+              <a:t>Mid Peak (M-F; 10:00-16:00)</a:t>
             </a:r>
           </a:p>
           <a:p>
             <a:pPr lvl="1"/>
             <a:r>
               <a:rPr lang="en-US" dirty="0"/>
-              <a:t>PM Peak (16:00-19:00)</a:t>
+              <a:t>PM Peak (M-F; 16:00-19:00)</a:t>
             </a:r>
           </a:p>
           <a:p>
             <a:pPr lvl="1"/>
             <a:r>
               <a:rPr lang="en-US" dirty="0"/>
-              <a:t>Weekend Peak (06:00-20:00)</a:t>
+              <a:t>Weekend Peak (Sa-</a:t>
+            </a:r>
+            <a:r>
+              <a:rPr lang="en-US" dirty="0" err="1"/>
+              <a:t>Su</a:t>
+            </a:r>
+            <a:r>
+              <a:rPr lang="en-US" dirty="0"/>
+              <a:t>; 06:00-20:00)</a:t>
             </a:r>
           </a:p>
           <a:p>
@@ -11523,7 +12914,7 @@
           </p:nvPr>
         </p:nvPicPr>
         <p:blipFill>
-          <a:blip r:embed="rId2"/>
+          <a:blip r:embed="rId3"/>
           <a:stretch>
             <a:fillRect/>
           </a:stretch>
@@ -11553,7 +12944,7 @@
           <p:nvPr/>
         </p:nvPicPr>
         <p:blipFill>
-          <a:blip r:embed="rId3"/>
+          <a:blip r:embed="rId4"/>
           <a:stretch>
             <a:fillRect/>
           </a:stretch>
@@ -11586,7 +12977,7 @@
           <p:nvPr/>
         </p:nvPicPr>
         <p:blipFill>
-          <a:blip r:embed="rId4"/>
+          <a:blip r:embed="rId5"/>
           <a:srcRect/>
           <a:stretch/>
         </p:blipFill>
@@ -11756,7 +13147,7 @@
           <p:nvPr/>
         </p:nvPicPr>
         <p:blipFill>
-          <a:blip r:embed="rId2"/>
+          <a:blip r:embed="rId3"/>
           <a:stretch>
             <a:fillRect/>
           </a:stretch>
@@ -11789,7 +13180,7 @@
           <p:nvPr/>
         </p:nvPicPr>
         <p:blipFill>
-          <a:blip r:embed="rId3"/>
+          <a:blip r:embed="rId4"/>
           <a:srcRect/>
           <a:stretch/>
         </p:blipFill>
@@ -11821,7 +13212,7 @@
           <p:nvPr/>
         </p:nvPicPr>
         <p:blipFill>
-          <a:blip r:embed="rId4"/>
+          <a:blip r:embed="rId5"/>
           <a:srcRect/>
           <a:stretch/>
         </p:blipFill>
@@ -11853,7 +13244,7 @@
           <p:nvPr/>
         </p:nvPicPr>
         <p:blipFill>
-          <a:blip r:embed="rId5"/>
+          <a:blip r:embed="rId6"/>
           <a:srcRect/>
           <a:stretch/>
         </p:blipFill>
@@ -12053,8 +13444,8 @@
           </a:p>
         </p:txBody>
       </p:sp>
-      <mc:AlternateContent xmlns:mc="http://schemas.openxmlformats.org/markup-compatibility/2006">
-        <mc:Choice xmlns:a14="http://schemas.microsoft.com/office/drawing/2010/main" Requires="a14">
+      <mc:AlternateContent xmlns:mc="http://schemas.openxmlformats.org/markup-compatibility/2006" xmlns:a14="http://schemas.microsoft.com/office/drawing/2010/main">
+        <mc:Choice Requires="a14">
           <p:sp>
             <p:nvSpPr>
               <p:cNvPr id="3" name="Content Placeholder 2">
@@ -12377,7 +13768,7 @@
             </p:txBody>
           </p:sp>
         </mc:Choice>
-        <mc:Fallback>
+        <mc:Fallback xmlns="">
           <p:sp>
             <p:nvSpPr>
               <p:cNvPr id="3" name="Content Placeholder 2">
@@ -12396,7 +13787,7 @@
             </p:nvSpPr>
             <p:spPr>
               <a:blipFill>
-                <a:blip r:embed="rId2"/>
+                <a:blip r:embed="rId3"/>
                 <a:stretch>
                   <a:fillRect l="-1086" t="-2326"/>
                 </a:stretch>

</xml_diff>